<commit_message>
Fixes design error in Package Dev cheatsheet.
</commit_message>
<xml_diff>
--- a/powerpoints/package-development.pptx
+++ b/powerpoints/package-development.pptx
@@ -1,6 +1,6 @@
 
 <file path=ppt/presentation.xml><?xml version="1.0" encoding="utf-8"?>
-<p:presentation xmlns:a="http://schemas.openxmlformats.org/drawingml/2006/main" xmlns:r="http://schemas.openxmlformats.org/officeDocument/2006/relationships" xmlns:p="http://schemas.openxmlformats.org/presentationml/2006/main">
+<p:presentation xmlns:a="http://schemas.openxmlformats.org/drawingml/2006/main" xmlns:r="http://schemas.openxmlformats.org/officeDocument/2006/relationships" xmlns:p="http://schemas.openxmlformats.org/presentationml/2006/main" xmlns:m="http://schemas.openxmlformats.org/officeDocument/2006/math" xmlns:a14="http://schemas.microsoft.com/office/drawing/2010/main">
   <p:sldMasterIdLst>
     <p:sldMasterId id="2147483648" r:id="rId5"/>
   </p:sldMasterIdLst>
@@ -315,11 +315,11 @@
 </file>
 
 <file path=ppt/commentAuthors.xml><?xml version="1.0" encoding="utf-8"?>
-<p:cmAuthorLst xmlns:a="http://schemas.openxmlformats.org/drawingml/2006/main" xmlns:r="http://schemas.openxmlformats.org/officeDocument/2006/relationships" xmlns:p="http://schemas.openxmlformats.org/presentationml/2006/main"/>
+<p:cmAuthorLst xmlns:a="http://schemas.openxmlformats.org/drawingml/2006/main" xmlns:r="http://schemas.openxmlformats.org/officeDocument/2006/relationships" xmlns:p="http://schemas.openxmlformats.org/presentationml/2006/main" xmlns:m="http://schemas.openxmlformats.org/officeDocument/2006/math" xmlns:a14="http://schemas.microsoft.com/office/drawing/2010/main"/>
 </file>
 
 <file path=ppt/notesMasters/notesMaster1.xml><?xml version="1.0" encoding="utf-8"?>
-<p:notesMaster xmlns:a="http://schemas.openxmlformats.org/drawingml/2006/main" xmlns:r="http://schemas.openxmlformats.org/officeDocument/2006/relationships" xmlns:p="http://schemas.openxmlformats.org/presentationml/2006/main">
+<p:notesMaster xmlns:a="http://schemas.openxmlformats.org/drawingml/2006/main" xmlns:r="http://schemas.openxmlformats.org/officeDocument/2006/relationships" xmlns:p="http://schemas.openxmlformats.org/presentationml/2006/main" xmlns:m="http://schemas.openxmlformats.org/officeDocument/2006/math" xmlns:a14="http://schemas.microsoft.com/office/drawing/2010/main">
   <p:cSld>
     <p:spTree>
       <p:nvGrpSpPr>
@@ -493,7 +493,7 @@
 </file>
 
 <file path=ppt/slideLayouts/slideLayout1.xml><?xml version="1.0" encoding="utf-8"?>
-<p:sldLayout xmlns:a="http://schemas.openxmlformats.org/drawingml/2006/main" xmlns:r="http://schemas.openxmlformats.org/officeDocument/2006/relationships" xmlns:p="http://schemas.openxmlformats.org/presentationml/2006/main" type="title" showMasterSp="1" showMasterPhAnim="1">
+<p:sldLayout xmlns:a="http://schemas.openxmlformats.org/drawingml/2006/main" xmlns:r="http://schemas.openxmlformats.org/officeDocument/2006/relationships" xmlns:p="http://schemas.openxmlformats.org/presentationml/2006/main" xmlns:m="http://schemas.openxmlformats.org/officeDocument/2006/math" xmlns:a14="http://schemas.microsoft.com/office/drawing/2010/main" type="title" showMasterSp="1" showMasterPhAnim="1">
   <p:cSld name="Title &amp; Subtitle">
     <p:spTree>
       <p:nvGrpSpPr>
@@ -667,7 +667,7 @@
 </file>
 
 <file path=ppt/slideLayouts/slideLayout10.xml><?xml version="1.0" encoding="utf-8"?>
-<p:sldLayout xmlns:a="http://schemas.openxmlformats.org/drawingml/2006/main" xmlns:r="http://schemas.openxmlformats.org/officeDocument/2006/relationships" xmlns:p="http://schemas.openxmlformats.org/presentationml/2006/main" type="tx" showMasterSp="1" showMasterPhAnim="1">
+<p:sldLayout xmlns:a="http://schemas.openxmlformats.org/drawingml/2006/main" xmlns:r="http://schemas.openxmlformats.org/officeDocument/2006/relationships" xmlns:p="http://schemas.openxmlformats.org/presentationml/2006/main" xmlns:m="http://schemas.openxmlformats.org/officeDocument/2006/math" xmlns:a14="http://schemas.microsoft.com/office/drawing/2010/main" type="tx" showMasterSp="1" showMasterPhAnim="1">
   <p:cSld name="Quote">
     <p:spTree>
       <p:nvGrpSpPr>
@@ -789,7 +789,7 @@
 </file>
 
 <file path=ppt/slideLayouts/slideLayout11.xml><?xml version="1.0" encoding="utf-8"?>
-<p:sldLayout xmlns:a="http://schemas.openxmlformats.org/drawingml/2006/main" xmlns:r="http://schemas.openxmlformats.org/officeDocument/2006/relationships" xmlns:p="http://schemas.openxmlformats.org/presentationml/2006/main" type="tx" showMasterSp="1" showMasterPhAnim="1">
+<p:sldLayout xmlns:a="http://schemas.openxmlformats.org/drawingml/2006/main" xmlns:r="http://schemas.openxmlformats.org/officeDocument/2006/relationships" xmlns:p="http://schemas.openxmlformats.org/presentationml/2006/main" xmlns:m="http://schemas.openxmlformats.org/officeDocument/2006/math" xmlns:a14="http://schemas.microsoft.com/office/drawing/2010/main" type="tx" showMasterSp="1" showMasterPhAnim="1">
   <p:cSld name="Photo">
     <p:spTree>
       <p:nvGrpSpPr>
@@ -864,7 +864,7 @@
 </file>
 
 <file path=ppt/slideLayouts/slideLayout12.xml><?xml version="1.0" encoding="utf-8"?>
-<p:sldLayout xmlns:a="http://schemas.openxmlformats.org/drawingml/2006/main" xmlns:r="http://schemas.openxmlformats.org/officeDocument/2006/relationships" xmlns:p="http://schemas.openxmlformats.org/presentationml/2006/main" type="tx" showMasterSp="1" showMasterPhAnim="1">
+<p:sldLayout xmlns:a="http://schemas.openxmlformats.org/drawingml/2006/main" xmlns:r="http://schemas.openxmlformats.org/officeDocument/2006/relationships" xmlns:p="http://schemas.openxmlformats.org/presentationml/2006/main" xmlns:m="http://schemas.openxmlformats.org/officeDocument/2006/math" xmlns:a14="http://schemas.microsoft.com/office/drawing/2010/main" type="tx" showMasterSp="1" showMasterPhAnim="1">
   <p:cSld name="Blank">
     <p:spTree>
       <p:nvGrpSpPr>
@@ -912,7 +912,7 @@
 </file>
 
 <file path=ppt/slideLayouts/slideLayout13.xml><?xml version="1.0" encoding="utf-8"?>
-<p:sldLayout xmlns:a="http://schemas.openxmlformats.org/drawingml/2006/main" xmlns:r="http://schemas.openxmlformats.org/officeDocument/2006/relationships" xmlns:p="http://schemas.openxmlformats.org/presentationml/2006/main" type="tx" showMasterSp="1" showMasterPhAnim="1">
+<p:sldLayout xmlns:a="http://schemas.openxmlformats.org/drawingml/2006/main" xmlns:r="http://schemas.openxmlformats.org/officeDocument/2006/relationships" xmlns:p="http://schemas.openxmlformats.org/presentationml/2006/main" xmlns:m="http://schemas.openxmlformats.org/officeDocument/2006/math" xmlns:a14="http://schemas.microsoft.com/office/drawing/2010/main" type="tx" showMasterSp="1" showMasterPhAnim="1">
   <p:cSld name="Title &amp; Bullets">
     <p:spTree>
       <p:nvGrpSpPr>
@@ -1048,7 +1048,7 @@
 </file>
 
 <file path=ppt/slideLayouts/slideLayout2.xml><?xml version="1.0" encoding="utf-8"?>
-<p:sldLayout xmlns:a="http://schemas.openxmlformats.org/drawingml/2006/main" xmlns:r="http://schemas.openxmlformats.org/officeDocument/2006/relationships" xmlns:p="http://schemas.openxmlformats.org/presentationml/2006/main" type="tx" showMasterSp="1" showMasterPhAnim="1">
+<p:sldLayout xmlns:a="http://schemas.openxmlformats.org/drawingml/2006/main" xmlns:r="http://schemas.openxmlformats.org/officeDocument/2006/relationships" xmlns:p="http://schemas.openxmlformats.org/presentationml/2006/main" xmlns:m="http://schemas.openxmlformats.org/officeDocument/2006/math" xmlns:a14="http://schemas.microsoft.com/office/drawing/2010/main" type="tx" showMasterSp="1" showMasterPhAnim="1">
   <p:cSld name="Photo - Horizontal">
     <p:spTree>
       <p:nvGrpSpPr>
@@ -1253,7 +1253,7 @@
 </file>
 
 <file path=ppt/slideLayouts/slideLayout3.xml><?xml version="1.0" encoding="utf-8"?>
-<p:sldLayout xmlns:a="http://schemas.openxmlformats.org/drawingml/2006/main" xmlns:r="http://schemas.openxmlformats.org/officeDocument/2006/relationships" xmlns:p="http://schemas.openxmlformats.org/presentationml/2006/main" type="tx" showMasterSp="1" showMasterPhAnim="1">
+<p:sldLayout xmlns:a="http://schemas.openxmlformats.org/drawingml/2006/main" xmlns:r="http://schemas.openxmlformats.org/officeDocument/2006/relationships" xmlns:p="http://schemas.openxmlformats.org/presentationml/2006/main" xmlns:m="http://schemas.openxmlformats.org/officeDocument/2006/math" xmlns:a14="http://schemas.microsoft.com/office/drawing/2010/main" type="tx" showMasterSp="1" showMasterPhAnim="1">
   <p:cSld name="Title - Center">
     <p:spTree>
       <p:nvGrpSpPr>
@@ -1329,7 +1329,7 @@
 </file>
 
 <file path=ppt/slideLayouts/slideLayout4.xml><?xml version="1.0" encoding="utf-8"?>
-<p:sldLayout xmlns:a="http://schemas.openxmlformats.org/drawingml/2006/main" xmlns:r="http://schemas.openxmlformats.org/officeDocument/2006/relationships" xmlns:p="http://schemas.openxmlformats.org/presentationml/2006/main" type="tx" showMasterSp="1" showMasterPhAnim="1">
+<p:sldLayout xmlns:a="http://schemas.openxmlformats.org/drawingml/2006/main" xmlns:r="http://schemas.openxmlformats.org/officeDocument/2006/relationships" xmlns:p="http://schemas.openxmlformats.org/presentationml/2006/main" xmlns:m="http://schemas.openxmlformats.org/officeDocument/2006/math" xmlns:a14="http://schemas.microsoft.com/office/drawing/2010/main" type="tx" showMasterSp="1" showMasterPhAnim="1">
   <p:cSld name="Photo - Vertical">
     <p:spTree>
       <p:nvGrpSpPr>
@@ -1539,7 +1539,7 @@
 </file>
 
 <file path=ppt/slideLayouts/slideLayout5.xml><?xml version="1.0" encoding="utf-8"?>
-<p:sldLayout xmlns:a="http://schemas.openxmlformats.org/drawingml/2006/main" xmlns:r="http://schemas.openxmlformats.org/officeDocument/2006/relationships" xmlns:p="http://schemas.openxmlformats.org/presentationml/2006/main" type="tx" showMasterSp="1" showMasterPhAnim="1">
+<p:sldLayout xmlns:a="http://schemas.openxmlformats.org/drawingml/2006/main" xmlns:r="http://schemas.openxmlformats.org/officeDocument/2006/relationships" xmlns:p="http://schemas.openxmlformats.org/presentationml/2006/main" xmlns:m="http://schemas.openxmlformats.org/officeDocument/2006/math" xmlns:a14="http://schemas.microsoft.com/office/drawing/2010/main" type="tx" showMasterSp="1" showMasterPhAnim="1">
   <p:cSld name="Title - Top">
     <p:spTree>
       <p:nvGrpSpPr>
@@ -1611,7 +1611,7 @@
 </file>
 
 <file path=ppt/slideLayouts/slideLayout6.xml><?xml version="1.0" encoding="utf-8"?>
-<p:sldLayout xmlns:a="http://schemas.openxmlformats.org/drawingml/2006/main" xmlns:r="http://schemas.openxmlformats.org/officeDocument/2006/relationships" xmlns:p="http://schemas.openxmlformats.org/presentationml/2006/main" type="tx" showMasterSp="1" showMasterPhAnim="1">
+<p:sldLayout xmlns:a="http://schemas.openxmlformats.org/drawingml/2006/main" xmlns:r="http://schemas.openxmlformats.org/officeDocument/2006/relationships" xmlns:p="http://schemas.openxmlformats.org/presentationml/2006/main" xmlns:m="http://schemas.openxmlformats.org/officeDocument/2006/math" xmlns:a14="http://schemas.microsoft.com/office/drawing/2010/main" type="tx" showMasterSp="1" showMasterPhAnim="1">
   <p:cSld name="Title &amp; Bullets">
     <p:spTree>
       <p:nvGrpSpPr>
@@ -1731,7 +1731,7 @@
 </file>
 
 <file path=ppt/slideLayouts/slideLayout7.xml><?xml version="1.0" encoding="utf-8"?>
-<p:sldLayout xmlns:a="http://schemas.openxmlformats.org/drawingml/2006/main" xmlns:r="http://schemas.openxmlformats.org/officeDocument/2006/relationships" xmlns:p="http://schemas.openxmlformats.org/presentationml/2006/main" type="tx" showMasterSp="1" showMasterPhAnim="1">
+<p:sldLayout xmlns:a="http://schemas.openxmlformats.org/drawingml/2006/main" xmlns:r="http://schemas.openxmlformats.org/officeDocument/2006/relationships" xmlns:p="http://schemas.openxmlformats.org/presentationml/2006/main" xmlns:m="http://schemas.openxmlformats.org/officeDocument/2006/math" xmlns:a14="http://schemas.microsoft.com/office/drawing/2010/main" type="tx" showMasterSp="1" showMasterPhAnim="1">
   <p:cSld name="Title, Bullets &amp; Photo">
     <p:spTree>
       <p:nvGrpSpPr>
@@ -1898,7 +1898,7 @@
 </file>
 
 <file path=ppt/slideLayouts/slideLayout8.xml><?xml version="1.0" encoding="utf-8"?>
-<p:sldLayout xmlns:a="http://schemas.openxmlformats.org/drawingml/2006/main" xmlns:r="http://schemas.openxmlformats.org/officeDocument/2006/relationships" xmlns:p="http://schemas.openxmlformats.org/presentationml/2006/main" type="tx" showMasterSp="1" showMasterPhAnim="1">
+<p:sldLayout xmlns:a="http://schemas.openxmlformats.org/drawingml/2006/main" xmlns:r="http://schemas.openxmlformats.org/officeDocument/2006/relationships" xmlns:p="http://schemas.openxmlformats.org/presentationml/2006/main" xmlns:m="http://schemas.openxmlformats.org/officeDocument/2006/math" xmlns:a14="http://schemas.microsoft.com/office/drawing/2010/main" type="tx" showMasterSp="1" showMasterPhAnim="1">
   <p:cSld name="Bullets">
     <p:spTree>
       <p:nvGrpSpPr>
@@ -1998,7 +1998,7 @@
 </file>
 
 <file path=ppt/slideLayouts/slideLayout9.xml><?xml version="1.0" encoding="utf-8"?>
-<p:sldLayout xmlns:a="http://schemas.openxmlformats.org/drawingml/2006/main" xmlns:r="http://schemas.openxmlformats.org/officeDocument/2006/relationships" xmlns:p="http://schemas.openxmlformats.org/presentationml/2006/main" type="tx" showMasterSp="1" showMasterPhAnim="1">
+<p:sldLayout xmlns:a="http://schemas.openxmlformats.org/drawingml/2006/main" xmlns:r="http://schemas.openxmlformats.org/officeDocument/2006/relationships" xmlns:p="http://schemas.openxmlformats.org/presentationml/2006/main" xmlns:m="http://schemas.openxmlformats.org/officeDocument/2006/math" xmlns:a14="http://schemas.microsoft.com/office/drawing/2010/main" type="tx" showMasterSp="1" showMasterPhAnim="1">
   <p:cSld name="Photo - 3 Up">
     <p:spTree>
       <p:nvGrpSpPr>
@@ -2127,7 +2127,7 @@
 </file>
 
 <file path=ppt/slideMasters/slideMaster1.xml><?xml version="1.0" encoding="utf-8"?>
-<p:sldMaster xmlns:a="http://schemas.openxmlformats.org/drawingml/2006/main" xmlns:r="http://schemas.openxmlformats.org/officeDocument/2006/relationships" xmlns:p="http://schemas.openxmlformats.org/presentationml/2006/main">
+<p:sldMaster xmlns:a="http://schemas.openxmlformats.org/drawingml/2006/main" xmlns:r="http://schemas.openxmlformats.org/officeDocument/2006/relationships" xmlns:p="http://schemas.openxmlformats.org/presentationml/2006/main" xmlns:m="http://schemas.openxmlformats.org/officeDocument/2006/math" xmlns:a14="http://schemas.microsoft.com/office/drawing/2010/main">
   <p:cSld>
     <p:bg>
       <p:bgPr>
@@ -3110,7 +3110,7 @@
 </file>
 
 <file path=ppt/slides/slide1.xml><?xml version="1.0" encoding="utf-8"?>
-<p:sld xmlns:a="http://schemas.openxmlformats.org/drawingml/2006/main" xmlns:r="http://schemas.openxmlformats.org/officeDocument/2006/relationships" xmlns:p="http://schemas.openxmlformats.org/presentationml/2006/main" showMasterSp="1" showMasterPhAnim="1">
+<p:sld xmlns:a="http://schemas.openxmlformats.org/drawingml/2006/main" xmlns:r="http://schemas.openxmlformats.org/officeDocument/2006/relationships" xmlns:p="http://schemas.openxmlformats.org/presentationml/2006/main" xmlns:m="http://schemas.openxmlformats.org/officeDocument/2006/math" xmlns:a14="http://schemas.microsoft.com/office/drawing/2010/main" showMasterSp="1" showMasterPhAnim="1">
   <p:cSld>
     <p:spTree>
       <p:nvGrpSpPr>
@@ -4867,8 +4867,8 @@
                     <a:tableStyleId>{2708684C-4D16-4618-839F-0558EEFCDFE6}</a:tableStyleId>
                   </a:tblPr>
                   <a:tblGrid>
-                    <a:gridCol w="1638300"/>
-                    <a:gridCol w="533400"/>
+                    <a:gridCol w="1663834"/>
+                    <a:gridCol w="507865"/>
                     <a:gridCol w="374575"/>
                     <a:gridCol w="374575"/>
                     <a:gridCol w="374575"/>
@@ -5534,7 +5534,7 @@
                           </a:r>
                         </a:p>
                       </a:txBody>
-                      <a:tcPr marL="12700" marR="12700" marT="12700" marB="12700" anchor="ctr" anchorCtr="0" horzOverflow="overflow">
+                      <a:tcPr marL="0" marR="0" marT="0" marB="0" anchor="ctr" anchorCtr="0" horzOverflow="overflow">
                         <a:lnL w="12700">
                           <a:solidFill>
                             <a:srgbClr val="A6AAA9"/>
@@ -7484,7 +7484,7 @@
                           </a:r>
                         </a:p>
                       </a:txBody>
-                      <a:tcPr marL="50800" marR="50800" marT="50800" marB="50800" anchor="ctr" anchorCtr="0" horzOverflow="overflow">
+                      <a:tcPr marL="38100" marR="38100" marT="38100" marB="38100" anchor="ctr" anchorCtr="0" horzOverflow="overflow">
                         <a:lnL w="12700">
                           <a:solidFill>
                             <a:srgbClr val="DCDEE0"/>
@@ -15097,7 +15097,7 @@
 </file>
 
 <file path=ppt/slides/slide2.xml><?xml version="1.0" encoding="utf-8"?>
-<p:sld xmlns:a="http://schemas.openxmlformats.org/drawingml/2006/main" xmlns:r="http://schemas.openxmlformats.org/officeDocument/2006/relationships" xmlns:p="http://schemas.openxmlformats.org/presentationml/2006/main" showMasterSp="1" showMasterPhAnim="1">
+<p:sld xmlns:a="http://schemas.openxmlformats.org/drawingml/2006/main" xmlns:r="http://schemas.openxmlformats.org/officeDocument/2006/relationships" xmlns:p="http://schemas.openxmlformats.org/presentationml/2006/main" xmlns:m="http://schemas.openxmlformats.org/officeDocument/2006/math" xmlns:a14="http://schemas.microsoft.com/office/drawing/2010/main" showMasterSp="1" showMasterPhAnim="1">
   <p:cSld>
     <p:spTree>
       <p:nvGrpSpPr>

</xml_diff>

<commit_message>
Returns color theming (light-weight) to cheatsheets.
</commit_message>
<xml_diff>
--- a/powerpoints/package-development.pptx
+++ b/powerpoints/package-development.pptx
@@ -3126,115 +3126,9 @@
           <a:chExt cx="0" cy="0"/>
         </a:xfrm>
       </p:grpSpPr>
-      <p:sp>
-        <p:nvSpPr>
-          <p:cNvPr id="128" name="Rectangle"/>
-          <p:cNvSpPr/>
-          <p:nvPr/>
-        </p:nvSpPr>
-        <p:spPr>
-          <a:xfrm>
-            <a:off x="4822590" y="8404679"/>
-            <a:ext cx="4350220" cy="595627"/>
-          </a:xfrm>
-          <a:prstGeom prst="rect">
-            <a:avLst/>
-          </a:prstGeom>
-          <a:gradFill>
-            <a:gsLst>
-              <a:gs pos="0">
-                <a:srgbClr val="FFFFFF">
-                  <a:alpha val="32629"/>
-                </a:srgbClr>
-              </a:gs>
-              <a:gs pos="100000">
-                <a:srgbClr val="FABF53">
-                  <a:alpha val="32629"/>
-                </a:srgbClr>
-              </a:gs>
-            </a:gsLst>
-            <a:lin ang="16200000"/>
-          </a:gradFill>
-          <a:ln w="12700">
-            <a:miter lim="400000"/>
-          </a:ln>
-        </p:spPr>
-        <p:txBody>
-          <a:bodyPr lIns="54570" tIns="54570" rIns="54570" bIns="54570" anchor="ctr"/>
-          <a:lstStyle/>
-          <a:p>
-            <a:pPr>
-              <a:lnSpc>
-                <a:spcPct val="80000"/>
-              </a:lnSpc>
-              <a:spcBef>
-                <a:spcPts val="0"/>
-              </a:spcBef>
-              <a:defRPr b="0">
-                <a:solidFill>
-                  <a:srgbClr val="000000"/>
-                </a:solidFill>
-              </a:defRPr>
-            </a:pPr>
-          </a:p>
-        </p:txBody>
-      </p:sp>
-      <p:sp>
-        <p:nvSpPr>
-          <p:cNvPr id="129" name="Rectangle"/>
-          <p:cNvSpPr/>
-          <p:nvPr/>
-        </p:nvSpPr>
-        <p:spPr>
-          <a:xfrm>
-            <a:off x="4822590" y="3299279"/>
-            <a:ext cx="4350220" cy="595627"/>
-          </a:xfrm>
-          <a:prstGeom prst="rect">
-            <a:avLst/>
-          </a:prstGeom>
-          <a:gradFill>
-            <a:gsLst>
-              <a:gs pos="0">
-                <a:srgbClr val="FFFFFF">
-                  <a:alpha val="32629"/>
-                </a:srgbClr>
-              </a:gs>
-              <a:gs pos="100000">
-                <a:srgbClr val="FABF53">
-                  <a:alpha val="32629"/>
-                </a:srgbClr>
-              </a:gs>
-            </a:gsLst>
-            <a:lin ang="16200000"/>
-          </a:gradFill>
-          <a:ln w="12700">
-            <a:miter lim="400000"/>
-          </a:ln>
-        </p:spPr>
-        <p:txBody>
-          <a:bodyPr lIns="54570" tIns="54570" rIns="54570" bIns="54570" anchor="ctr"/>
-          <a:lstStyle/>
-          <a:p>
-            <a:pPr>
-              <a:lnSpc>
-                <a:spcPct val="80000"/>
-              </a:lnSpc>
-              <a:spcBef>
-                <a:spcPts val="0"/>
-              </a:spcBef>
-              <a:defRPr b="0">
-                <a:solidFill>
-                  <a:srgbClr val="000000"/>
-                </a:solidFill>
-              </a:defRPr>
-            </a:pPr>
-          </a:p>
-        </p:txBody>
-      </p:sp>
       <p:pic>
         <p:nvPicPr>
-          <p:cNvPr id="130" name="Image" descr="Image"/>
+          <p:cNvPr id="128" name="Image" descr="Image"/>
           <p:cNvPicPr>
             <a:picLocks noChangeAspect="1"/>
           </p:cNvPicPr>
@@ -3263,20 +3157,538 @@
       </p:pic>
       <p:sp>
         <p:nvSpPr>
-          <p:cNvPr id="131" name="Group"/>
+          <p:cNvPr id="129" name="Package: mypackage…"/>
           <p:cNvSpPr/>
           <p:nvPr/>
         </p:nvSpPr>
         <p:spPr>
           <a:xfrm>
-            <a:off x="9422106" y="4987184"/>
-            <a:ext cx="4259110" cy="1412168"/>
+            <a:off x="9537889" y="1899237"/>
+            <a:ext cx="4027542" cy="2077541"/>
           </a:xfrm>
           <a:prstGeom prst="rect">
             <a:avLst/>
           </a:prstGeom>
           <a:solidFill>
-            <a:srgbClr val="79B0DC">
+            <a:srgbClr val="FFFFFF"/>
+          </a:solidFill>
+          <a:ln w="12700">
+            <a:solidFill>
+              <a:srgbClr val="53585F"/>
+            </a:solidFill>
+            <a:miter lim="400000"/>
+          </a:ln>
+          <a:effectLst>
+            <a:outerShdw sx="100000" sy="100000" kx="0" ky="0" algn="b" rotWithShape="0" blurRad="38100" dist="25400" dir="5400000">
+              <a:srgbClr val="000000">
+                <a:alpha val="50000"/>
+              </a:srgbClr>
+            </a:outerShdw>
+          </a:effectLst>
+          <a:extLst>
+            <a:ext uri="{C572A759-6A51-4108-AA02-DFA0A04FC94B}">
+              <ma14:wrappingTextBoxFlag xmlns:ma14="http://schemas.microsoft.com/office/mac/drawingml/2011/main" val="1"/>
+            </a:ext>
+          </a:extLst>
+        </p:spPr>
+        <p:txBody>
+          <a:bodyPr lIns="54570" tIns="54570" rIns="54570" bIns="54570" anchor="ctr"/>
+          <a:lstStyle/>
+          <a:p>
+            <a:pPr>
+              <a:spcBef>
+                <a:spcPts val="0"/>
+              </a:spcBef>
+              <a:defRPr b="0" sz="950">
+                <a:solidFill>
+                  <a:srgbClr val="000000"/>
+                </a:solidFill>
+                <a:latin typeface="Menlo"/>
+                <a:ea typeface="Menlo"/>
+                <a:cs typeface="Menlo"/>
+                <a:sym typeface="Menlo"/>
+              </a:defRPr>
+            </a:pPr>
+            <a:r>
+              <a:t>Package: mypackage</a:t>
+            </a:r>
+          </a:p>
+          <a:p>
+            <a:pPr>
+              <a:spcBef>
+                <a:spcPts val="0"/>
+              </a:spcBef>
+              <a:defRPr b="0" sz="950">
+                <a:solidFill>
+                  <a:srgbClr val="000000"/>
+                </a:solidFill>
+                <a:latin typeface="Menlo"/>
+                <a:ea typeface="Menlo"/>
+                <a:cs typeface="Menlo"/>
+                <a:sym typeface="Menlo"/>
+              </a:defRPr>
+            </a:pPr>
+            <a:r>
+              <a:t>Title: Title of Package</a:t>
+            </a:r>
+          </a:p>
+          <a:p>
+            <a:pPr>
+              <a:spcBef>
+                <a:spcPts val="0"/>
+              </a:spcBef>
+              <a:defRPr b="0" sz="950">
+                <a:solidFill>
+                  <a:srgbClr val="000000"/>
+                </a:solidFill>
+                <a:latin typeface="Menlo"/>
+                <a:ea typeface="Menlo"/>
+                <a:cs typeface="Menlo"/>
+                <a:sym typeface="Menlo"/>
+              </a:defRPr>
+            </a:pPr>
+            <a:r>
+              <a:t>Version: 0.1.0</a:t>
+            </a:r>
+          </a:p>
+          <a:p>
+            <a:pPr>
+              <a:spcBef>
+                <a:spcPts val="0"/>
+              </a:spcBef>
+              <a:defRPr b="0" sz="950">
+                <a:solidFill>
+                  <a:srgbClr val="000000"/>
+                </a:solidFill>
+                <a:latin typeface="Menlo"/>
+                <a:ea typeface="Menlo"/>
+                <a:cs typeface="Menlo"/>
+                <a:sym typeface="Menlo"/>
+              </a:defRPr>
+            </a:pPr>
+            <a:r>
+              <a:t>Authors@R: person("Hadley", "Wickham", email = </a:t>
+            </a:r>
+          </a:p>
+          <a:p>
+            <a:pPr>
+              <a:spcBef>
+                <a:spcPts val="0"/>
+              </a:spcBef>
+              <a:defRPr b="0" sz="950">
+                <a:solidFill>
+                  <a:srgbClr val="000000"/>
+                </a:solidFill>
+                <a:latin typeface="Menlo"/>
+                <a:ea typeface="Menlo"/>
+                <a:cs typeface="Menlo"/>
+                <a:sym typeface="Menlo"/>
+              </a:defRPr>
+            </a:pPr>
+            <a:r>
+              <a:t>    "</a:t>
+            </a:r>
+            <a:r>
+              <a:rPr u="sng">
+                <a:hlinkClick r:id="rId3" invalidUrl="" action="" tgtFrame="" tooltip="" history="1" highlightClick="0" endSnd="0"/>
+              </a:rPr>
+              <a:t>hadley@me.com</a:t>
+            </a:r>
+            <a:r>
+              <a:t>", role = c("aut", "cre"))</a:t>
+            </a:r>
+          </a:p>
+          <a:p>
+            <a:pPr>
+              <a:spcBef>
+                <a:spcPts val="0"/>
+              </a:spcBef>
+              <a:defRPr b="0" sz="950">
+                <a:solidFill>
+                  <a:srgbClr val="000000"/>
+                </a:solidFill>
+                <a:latin typeface="Menlo"/>
+                <a:ea typeface="Menlo"/>
+                <a:cs typeface="Menlo"/>
+                <a:sym typeface="Menlo"/>
+              </a:defRPr>
+            </a:pPr>
+            <a:r>
+              <a:t>Description: What the package does (one paragraph)</a:t>
+            </a:r>
+          </a:p>
+          <a:p>
+            <a:pPr>
+              <a:spcBef>
+                <a:spcPts val="0"/>
+              </a:spcBef>
+              <a:defRPr b="0" sz="950">
+                <a:solidFill>
+                  <a:srgbClr val="000000"/>
+                </a:solidFill>
+                <a:latin typeface="Menlo"/>
+                <a:ea typeface="Menlo"/>
+                <a:cs typeface="Menlo"/>
+                <a:sym typeface="Menlo"/>
+              </a:defRPr>
+            </a:pPr>
+            <a:r>
+              <a:t>Depends: R (&gt;= 3.1.0)</a:t>
+            </a:r>
+          </a:p>
+          <a:p>
+            <a:pPr>
+              <a:spcBef>
+                <a:spcPts val="0"/>
+              </a:spcBef>
+              <a:defRPr b="0" sz="950">
+                <a:solidFill>
+                  <a:srgbClr val="000000"/>
+                </a:solidFill>
+                <a:latin typeface="Menlo"/>
+                <a:ea typeface="Menlo"/>
+                <a:cs typeface="Menlo"/>
+                <a:sym typeface="Menlo"/>
+              </a:defRPr>
+            </a:pPr>
+            <a:r>
+              <a:t>License: GPL-2</a:t>
+            </a:r>
+          </a:p>
+          <a:p>
+            <a:pPr>
+              <a:spcBef>
+                <a:spcPts val="0"/>
+              </a:spcBef>
+              <a:defRPr b="0" sz="950">
+                <a:solidFill>
+                  <a:srgbClr val="000000"/>
+                </a:solidFill>
+                <a:latin typeface="Menlo"/>
+                <a:ea typeface="Menlo"/>
+                <a:cs typeface="Menlo"/>
+                <a:sym typeface="Menlo"/>
+              </a:defRPr>
+            </a:pPr>
+            <a:r>
+              <a:t>LazyData: true</a:t>
+            </a:r>
+          </a:p>
+          <a:p>
+            <a:pPr>
+              <a:spcBef>
+                <a:spcPts val="0"/>
+              </a:spcBef>
+              <a:defRPr b="0" sz="950">
+                <a:solidFill>
+                  <a:srgbClr val="000000"/>
+                </a:solidFill>
+                <a:latin typeface="Menlo"/>
+                <a:ea typeface="Menlo"/>
+                <a:cs typeface="Menlo"/>
+                <a:sym typeface="Menlo"/>
+              </a:defRPr>
+            </a:pPr>
+            <a:r>
+              <a:t>Imports: </a:t>
+            </a:r>
+          </a:p>
+          <a:p>
+            <a:pPr>
+              <a:spcBef>
+                <a:spcPts val="0"/>
+              </a:spcBef>
+              <a:defRPr b="0" sz="950">
+                <a:solidFill>
+                  <a:srgbClr val="000000"/>
+                </a:solidFill>
+                <a:latin typeface="Menlo"/>
+                <a:ea typeface="Menlo"/>
+                <a:cs typeface="Menlo"/>
+                <a:sym typeface="Menlo"/>
+              </a:defRPr>
+            </a:pPr>
+            <a:r>
+              <a:t>    dplyr (&gt;= 0.4.0),</a:t>
+            </a:r>
+          </a:p>
+          <a:p>
+            <a:pPr>
+              <a:spcBef>
+                <a:spcPts val="0"/>
+              </a:spcBef>
+              <a:defRPr b="0" sz="950">
+                <a:solidFill>
+                  <a:srgbClr val="000000"/>
+                </a:solidFill>
+                <a:latin typeface="Menlo"/>
+                <a:ea typeface="Menlo"/>
+                <a:cs typeface="Menlo"/>
+                <a:sym typeface="Menlo"/>
+              </a:defRPr>
+            </a:pPr>
+            <a:r>
+              <a:t>    ggvis (&gt;= 0.2)</a:t>
+            </a:r>
+          </a:p>
+          <a:p>
+            <a:pPr>
+              <a:spcBef>
+                <a:spcPts val="0"/>
+              </a:spcBef>
+              <a:defRPr b="0" sz="950">
+                <a:solidFill>
+                  <a:srgbClr val="000000"/>
+                </a:solidFill>
+                <a:latin typeface="Menlo"/>
+                <a:ea typeface="Menlo"/>
+                <a:cs typeface="Menlo"/>
+                <a:sym typeface="Menlo"/>
+              </a:defRPr>
+            </a:pPr>
+            <a:r>
+              <a:t>Suggests:</a:t>
+            </a:r>
+          </a:p>
+          <a:p>
+            <a:pPr>
+              <a:spcBef>
+                <a:spcPts val="0"/>
+              </a:spcBef>
+              <a:defRPr b="0" sz="950">
+                <a:solidFill>
+                  <a:srgbClr val="000000"/>
+                </a:solidFill>
+                <a:latin typeface="Menlo"/>
+                <a:ea typeface="Menlo"/>
+                <a:cs typeface="Menlo"/>
+                <a:sym typeface="Menlo"/>
+              </a:defRPr>
+            </a:pPr>
+            <a:r>
+              <a:t>    knitr (&gt;= 0.1.0)</a:t>
+            </a:r>
+          </a:p>
+        </p:txBody>
+      </p:sp>
+      <p:sp>
+        <p:nvSpPr>
+          <p:cNvPr id="130" name="Rounded Rectangle"/>
+          <p:cNvSpPr/>
+          <p:nvPr/>
+        </p:nvSpPr>
+        <p:spPr>
+          <a:xfrm>
+            <a:off x="11429834" y="3426118"/>
+            <a:ext cx="2098600" cy="515542"/>
+          </a:xfrm>
+          <a:prstGeom prst="roundRect">
+            <a:avLst>
+              <a:gd name="adj" fmla="val 6231"/>
+            </a:avLst>
+          </a:prstGeom>
+          <a:solidFill>
+            <a:srgbClr val="DCDEE0"/>
+          </a:solidFill>
+          <a:ln w="12700">
+            <a:miter lim="400000"/>
+          </a:ln>
+        </p:spPr>
+        <p:txBody>
+          <a:bodyPr lIns="54570" tIns="54570" rIns="54570" bIns="54570" anchor="ctr"/>
+          <a:lstStyle/>
+          <a:p>
+            <a:pPr>
+              <a:spcBef>
+                <a:spcPts val="0"/>
+              </a:spcBef>
+              <a:defRPr b="0" sz="1000">
+                <a:solidFill>
+                  <a:srgbClr val="000000"/>
+                </a:solidFill>
+                <a:latin typeface="Menlo"/>
+                <a:ea typeface="Menlo"/>
+                <a:cs typeface="Menlo"/>
+                <a:sym typeface="Menlo"/>
+              </a:defRPr>
+            </a:pPr>
+          </a:p>
+        </p:txBody>
+      </p:sp>
+      <p:sp>
+        <p:nvSpPr>
+          <p:cNvPr id="131" name="Suggest packages that are not very essential to yours. Users can install them manually, or not, as they like."/>
+          <p:cNvSpPr txBox="1"/>
+          <p:nvPr/>
+        </p:nvSpPr>
+        <p:spPr>
+          <a:xfrm>
+            <a:off x="11392977" y="3346368"/>
+            <a:ext cx="2136408" cy="629689"/>
+          </a:xfrm>
+          <a:prstGeom prst="rect">
+            <a:avLst/>
+          </a:prstGeom>
+          <a:ln w="12700">
+            <a:miter lim="400000"/>
+          </a:ln>
+          <a:extLst>
+            <a:ext uri="{C572A759-6A51-4108-AA02-DFA0A04FC94B}">
+              <ma14:wrappingTextBoxFlag xmlns:ma14="http://schemas.microsoft.com/office/mac/drawingml/2011/main" val="1"/>
+            </a:ext>
+          </a:extLst>
+        </p:spPr>
+        <p:txBody>
+          <a:bodyPr lIns="54570" tIns="54570" rIns="54570" bIns="54570" anchor="ctr">
+            <a:normAutofit fontScale="100000" lnSpcReduction="0"/>
+          </a:bodyPr>
+          <a:lstStyle/>
+          <a:p>
+            <a:pPr>
+              <a:lnSpc>
+                <a:spcPct val="90000"/>
+              </a:lnSpc>
+              <a:spcBef>
+                <a:spcPts val="300"/>
+              </a:spcBef>
+              <a:defRPr b="0" sz="1000">
+                <a:solidFill>
+                  <a:srgbClr val="000000"/>
+                </a:solidFill>
+              </a:defRPr>
+            </a:pPr>
+            <a:r>
+              <a:rPr b="1"/>
+              <a:t>Suggest</a:t>
+            </a:r>
+            <a:r>
+              <a:t> packages that are not very essential to yours. Users can install them manually, or not, as they like.</a:t>
+            </a:r>
+          </a:p>
+        </p:txBody>
+      </p:sp>
+      <p:sp>
+        <p:nvSpPr>
+          <p:cNvPr id="132" name="Rectangle"/>
+          <p:cNvSpPr/>
+          <p:nvPr/>
+        </p:nvSpPr>
+        <p:spPr>
+          <a:xfrm>
+            <a:off x="4822590" y="8404679"/>
+            <a:ext cx="4350220" cy="595627"/>
+          </a:xfrm>
+          <a:prstGeom prst="rect">
+            <a:avLst/>
+          </a:prstGeom>
+          <a:gradFill>
+            <a:gsLst>
+              <a:gs pos="0">
+                <a:srgbClr val="FFFFFF">
+                  <a:alpha val="32629"/>
+                </a:srgbClr>
+              </a:gs>
+              <a:gs pos="100000">
+                <a:srgbClr val="A6AAA9">
+                  <a:alpha val="32629"/>
+                </a:srgbClr>
+              </a:gs>
+            </a:gsLst>
+            <a:lin ang="16200000"/>
+          </a:gradFill>
+          <a:ln w="12700">
+            <a:miter lim="400000"/>
+          </a:ln>
+        </p:spPr>
+        <p:txBody>
+          <a:bodyPr lIns="54570" tIns="54570" rIns="54570" bIns="54570" anchor="ctr"/>
+          <a:lstStyle/>
+          <a:p>
+            <a:pPr>
+              <a:lnSpc>
+                <a:spcPct val="80000"/>
+              </a:lnSpc>
+              <a:spcBef>
+                <a:spcPts val="0"/>
+              </a:spcBef>
+              <a:defRPr b="0">
+                <a:solidFill>
+                  <a:srgbClr val="000000"/>
+                </a:solidFill>
+              </a:defRPr>
+            </a:pPr>
+          </a:p>
+        </p:txBody>
+      </p:sp>
+      <p:sp>
+        <p:nvSpPr>
+          <p:cNvPr id="133" name="Rectangle"/>
+          <p:cNvSpPr/>
+          <p:nvPr/>
+        </p:nvSpPr>
+        <p:spPr>
+          <a:xfrm>
+            <a:off x="4822590" y="3299279"/>
+            <a:ext cx="4350220" cy="595627"/>
+          </a:xfrm>
+          <a:prstGeom prst="rect">
+            <a:avLst/>
+          </a:prstGeom>
+          <a:gradFill>
+            <a:gsLst>
+              <a:gs pos="0">
+                <a:srgbClr val="FFFFFF">
+                  <a:alpha val="32629"/>
+                </a:srgbClr>
+              </a:gs>
+              <a:gs pos="100000">
+                <a:srgbClr val="A6AAA9">
+                  <a:alpha val="32629"/>
+                </a:srgbClr>
+              </a:gs>
+            </a:gsLst>
+            <a:lin ang="16200000"/>
+          </a:gradFill>
+          <a:ln w="12700">
+            <a:miter lim="400000"/>
+          </a:ln>
+        </p:spPr>
+        <p:txBody>
+          <a:bodyPr lIns="54570" tIns="54570" rIns="54570" bIns="54570" anchor="ctr"/>
+          <a:lstStyle/>
+          <a:p>
+            <a:pPr>
+              <a:lnSpc>
+                <a:spcPct val="80000"/>
+              </a:lnSpc>
+              <a:spcBef>
+                <a:spcPts val="0"/>
+              </a:spcBef>
+              <a:defRPr b="0">
+                <a:solidFill>
+                  <a:srgbClr val="000000"/>
+                </a:solidFill>
+              </a:defRPr>
+            </a:pPr>
+          </a:p>
+        </p:txBody>
+      </p:sp>
+      <p:sp>
+        <p:nvSpPr>
+          <p:cNvPr id="134" name="Rectangle"/>
+          <p:cNvSpPr/>
+          <p:nvPr/>
+        </p:nvSpPr>
+        <p:spPr>
+          <a:xfrm>
+            <a:off x="9422107" y="4987184"/>
+            <a:ext cx="4259109" cy="1412168"/>
+          </a:xfrm>
+          <a:prstGeom prst="rect">
+            <a:avLst/>
+          </a:prstGeom>
+          <a:solidFill>
+            <a:srgbClr val="A6AAA9">
               <a:alpha val="23776"/>
             </a:srgbClr>
           </a:solidFill>
@@ -3306,7 +3718,7 @@
       </p:sp>
       <p:sp>
         <p:nvSpPr>
-          <p:cNvPr id="132" name="Group"/>
+          <p:cNvPr id="135" name="Rectangle"/>
           <p:cNvSpPr/>
           <p:nvPr/>
         </p:nvSpPr>
@@ -3319,7 +3731,7 @@
             <a:avLst/>
           </a:prstGeom>
           <a:solidFill>
-            <a:srgbClr val="79B0DC">
+            <a:srgbClr val="A6AAA9">
               <a:alpha val="23776"/>
             </a:srgbClr>
           </a:solidFill>
@@ -3349,7 +3761,7 @@
       </p:sp>
       <p:sp>
         <p:nvSpPr>
-          <p:cNvPr id="133" name="Group"/>
+          <p:cNvPr id="136" name="Rectangle"/>
           <p:cNvSpPr/>
           <p:nvPr/>
         </p:nvSpPr>
@@ -3362,7 +3774,7 @@
             <a:avLst/>
           </a:prstGeom>
           <a:solidFill>
-            <a:srgbClr val="79B0DC">
+            <a:srgbClr val="A6AAA9">
               <a:alpha val="23776"/>
             </a:srgbClr>
           </a:solidFill>
@@ -3392,7 +3804,7 @@
       </p:sp>
       <p:sp>
         <p:nvSpPr>
-          <p:cNvPr id="134" name=""/>
+          <p:cNvPr id="137" name=""/>
           <p:cNvSpPr txBox="1"/>
           <p:nvPr/>
         </p:nvSpPr>
@@ -3424,11 +3836,7 @@
               </a:spcBef>
               <a:defRPr b="0" sz="2400">
                 <a:solidFill>
-                  <a:schemeClr val="accent1">
-                    <a:hueOff val="195744"/>
-                    <a:satOff val="-47052"/>
-                    <a:lumOff val="24890"/>
-                  </a:schemeClr>
+                  <a:srgbClr val="797979"/>
                 </a:solidFill>
                 <a:latin typeface="FontAwesome"/>
                 <a:ea typeface="FontAwesome"/>
@@ -3447,7 +3855,7 @@
       </p:sp>
       <p:sp>
         <p:nvSpPr>
-          <p:cNvPr id="135" name="Use  tests/ to store tests that will alert you if your code breaks."/>
+          <p:cNvPr id="138" name="Use  tests/ to store tests that will alert you if your code breaks."/>
           <p:cNvSpPr txBox="1"/>
           <p:nvPr/>
         </p:nvSpPr>
@@ -3507,7 +3915,7 @@
       </p:sp>
       <p:sp>
         <p:nvSpPr>
-          <p:cNvPr id="136" name="Add a tests/ directory…"/>
+          <p:cNvPr id="139" name="Add a tests/ directory…"/>
           <p:cNvSpPr txBox="1"/>
           <p:nvPr/>
         </p:nvSpPr>
@@ -3585,11 +3993,7 @@
             <a:r>
               <a:rPr>
                 <a:solidFill>
-                  <a:schemeClr val="accent1">
-                    <a:hueOff val="195744"/>
-                    <a:satOff val="-47052"/>
-                    <a:lumOff val="24890"/>
-                  </a:schemeClr>
+                  <a:srgbClr val="797979"/>
                 </a:solidFill>
               </a:rPr>
               <a:t>devtools::</a:t>
@@ -3678,7 +4082,7 @@
       </p:sp>
       <p:sp>
         <p:nvSpPr>
-          <p:cNvPr id="137" name="1. Modify your code or tests.…"/>
+          <p:cNvPr id="140" name="1. Modify your code or tests.…"/>
           <p:cNvSpPr txBox="1"/>
           <p:nvPr/>
         </p:nvSpPr>
@@ -3775,11 +4179,7 @@
             <a:r>
               <a:rPr>
                 <a:solidFill>
-                  <a:schemeClr val="accent1">
-                    <a:hueOff val="195744"/>
-                    <a:satOff val="-47052"/>
-                    <a:lumOff val="24890"/>
-                  </a:schemeClr>
+                  <a:srgbClr val="797979"/>
                 </a:solidFill>
               </a:rPr>
               <a:t>devtools::</a:t>
@@ -3893,11 +4293,7 @@
               </a:spcBef>
               <a:defRPr b="0">
                 <a:solidFill>
-                  <a:schemeClr val="accent1">
-                    <a:hueOff val="195744"/>
-                    <a:satOff val="-47052"/>
-                    <a:lumOff val="24890"/>
-                  </a:schemeClr>
+                  <a:srgbClr val="797979"/>
                 </a:solidFill>
               </a:defRPr>
             </a:pPr>
@@ -3936,7 +4332,7 @@
       </p:sp>
       <p:sp>
         <p:nvSpPr>
-          <p:cNvPr id="138" name=""/>
+          <p:cNvPr id="141" name=""/>
           <p:cNvSpPr txBox="1"/>
           <p:nvPr/>
         </p:nvSpPr>
@@ -3968,11 +4364,7 @@
               </a:spcBef>
               <a:defRPr b="0" sz="2400">
                 <a:solidFill>
-                  <a:schemeClr val="accent1">
-                    <a:hueOff val="195744"/>
-                    <a:satOff val="-47052"/>
-                    <a:lumOff val="24890"/>
-                  </a:schemeClr>
+                  <a:srgbClr val="797979"/>
                 </a:solidFill>
                 <a:latin typeface="FontAwesome"/>
                 <a:ea typeface="FontAwesome"/>
@@ -3991,7 +4383,7 @@
       </p:sp>
       <p:sp>
         <p:nvSpPr>
-          <p:cNvPr id="139" name=""/>
+          <p:cNvPr id="142" name=""/>
           <p:cNvSpPr txBox="1"/>
           <p:nvPr/>
         </p:nvSpPr>
@@ -4023,11 +4415,7 @@
               </a:spcBef>
               <a:defRPr b="0" sz="2400">
                 <a:solidFill>
-                  <a:schemeClr val="accent1">
-                    <a:hueOff val="195744"/>
-                    <a:satOff val="-47052"/>
-                    <a:lumOff val="24890"/>
-                  </a:schemeClr>
+                  <a:srgbClr val="797979"/>
                 </a:solidFill>
                 <a:latin typeface="FontAwesome"/>
                 <a:ea typeface="FontAwesome"/>
@@ -4046,7 +4434,7 @@
       </p:sp>
       <p:sp>
         <p:nvSpPr>
-          <p:cNvPr id="140" name="context(&quot;Arithmetic&quot;)…"/>
+          <p:cNvPr id="143" name="context(&quot;Arithmetic&quot;)…"/>
           <p:cNvSpPr/>
           <p:nvPr/>
         </p:nvSpPr>
@@ -4210,7 +4598,7 @@
       </p:sp>
       <p:sp>
         <p:nvSpPr>
-          <p:cNvPr id="141" name="Square"/>
+          <p:cNvPr id="144" name="Square"/>
           <p:cNvSpPr/>
           <p:nvPr/>
         </p:nvSpPr>
@@ -4251,7 +4639,7 @@
       </p:sp>
       <p:sp>
         <p:nvSpPr>
-          <p:cNvPr id="142" name="Rectangle"/>
+          <p:cNvPr id="145" name="Rectangle"/>
           <p:cNvSpPr/>
           <p:nvPr/>
         </p:nvSpPr>
@@ -4292,7 +4680,7 @@
       </p:sp>
       <p:sp>
         <p:nvSpPr>
-          <p:cNvPr id="143" name="Package Structure"/>
+          <p:cNvPr id="146" name="Package Structure"/>
           <p:cNvSpPr txBox="1"/>
           <p:nvPr/>
         </p:nvSpPr>
@@ -4328,7 +4716,7 @@
               </a:spcBef>
               <a:defRPr b="0" sz="2500">
                 <a:solidFill>
-                  <a:srgbClr val="628DB5"/>
+                  <a:srgbClr val="797979"/>
                 </a:solidFill>
               </a:defRPr>
             </a:pPr>
@@ -4340,7 +4728,7 @@
       </p:sp>
       <p:sp>
         <p:nvSpPr>
-          <p:cNvPr id="144" name="Line"/>
+          <p:cNvPr id="147" name="Line"/>
           <p:cNvSpPr/>
           <p:nvPr/>
         </p:nvSpPr>
@@ -4381,7 +4769,7 @@
       </p:sp>
       <p:sp>
         <p:nvSpPr>
-          <p:cNvPr id="145" name="Package Development: : CHEAT SHEET"/>
+          <p:cNvPr id="148" name="Package Development: : CHEAT SHEET"/>
           <p:cNvSpPr txBox="1"/>
           <p:nvPr>
             <p:ph type="title"/>
@@ -4400,7 +4788,13 @@
           <a:bodyPr lIns="0" tIns="0" rIns="0" bIns="0" anchor="t"/>
           <a:lstStyle/>
           <a:p>
-            <a:pPr/>
+            <a:pPr>
+              <a:defRPr>
+                <a:solidFill>
+                  <a:srgbClr val="424242"/>
+                </a:solidFill>
+              </a:defRPr>
+            </a:pPr>
             <a:r>
               <a:t>Package Development: : </a:t>
             </a:r>
@@ -4421,7 +4815,7 @@
       </p:sp>
       <p:sp>
         <p:nvSpPr>
-          <p:cNvPr id="146" name="Line"/>
+          <p:cNvPr id="149" name="Line"/>
           <p:cNvSpPr/>
           <p:nvPr/>
         </p:nvSpPr>
@@ -4462,7 +4856,7 @@
       </p:sp>
       <p:sp>
         <p:nvSpPr>
-          <p:cNvPr id="147" name="Setup ( DESCRIPTION)"/>
+          <p:cNvPr id="150" name="Setup ( DESCRIPTION)"/>
           <p:cNvSpPr txBox="1"/>
           <p:nvPr/>
         </p:nvSpPr>
@@ -4498,7 +4892,7 @@
               </a:spcBef>
               <a:defRPr b="0" sz="2500">
                 <a:solidFill>
-                  <a:srgbClr val="628DB5"/>
+                  <a:srgbClr val="797979"/>
                 </a:solidFill>
               </a:defRPr>
             </a:pPr>
@@ -4522,7 +4916,7 @@
       </p:sp>
       <p:sp>
         <p:nvSpPr>
-          <p:cNvPr id="148" name="RStudio® is a trademark of RStudio, Inc.  •  CC BY SA  RStudio •  info@rstudio.com  •  844-448-1212 • rstudio.com •  Learn more at http://r-pkgs.had.co.nz/  •  devtools 1.5.1  •  Updated: 2015-01"/>
+          <p:cNvPr id="151" name="RStudio® is a trademark of RStudio, Inc.  •  CC BY SA  RStudio •  info@rstudio.com  •  844-448-1212 • rstudio.com •  Learn more at http://r-pkgs.had.co.nz/  •  devtools 1.5.1  •  Updated: 2015-01"/>
           <p:cNvSpPr txBox="1"/>
           <p:nvPr/>
         </p:nvSpPr>
@@ -4567,7 +4961,7 @@
             </a:r>
             <a:r>
               <a:rPr>
-                <a:hlinkClick r:id="rId3" invalidUrl="" action="" tgtFrame="" tooltip="" history="1" highlightClick="0" endSnd="0"/>
+                <a:hlinkClick r:id="rId4" invalidUrl="" action="" tgtFrame="" tooltip="" history="1" highlightClick="0" endSnd="0"/>
               </a:rPr>
               <a:t>CC BY SA</a:t>
             </a:r>
@@ -4576,7 +4970,7 @@
             </a:r>
             <a:r>
               <a:rPr>
-                <a:hlinkClick r:id="rId4" invalidUrl="" action="" tgtFrame="" tooltip="" history="1" highlightClick="0" endSnd="0"/>
+                <a:hlinkClick r:id="rId5" invalidUrl="" action="" tgtFrame="" tooltip="" history="1" highlightClick="0" endSnd="0"/>
               </a:rPr>
               <a:t>info@rstudio.com</a:t>
             </a:r>
@@ -4585,7 +4979,7 @@
             </a:r>
             <a:r>
               <a:rPr>
-                <a:hlinkClick r:id="rId5" invalidUrl="" action="" tgtFrame="" tooltip="" history="1" highlightClick="0" endSnd="0"/>
+                <a:hlinkClick r:id="rId6" invalidUrl="" action="" tgtFrame="" tooltip="" history="1" highlightClick="0" endSnd="0"/>
               </a:rPr>
               <a:t>rstudio.com</a:t>
             </a:r>
@@ -4604,14 +4998,14 @@
       </p:sp>
       <p:pic>
         <p:nvPicPr>
-          <p:cNvPr id="149" name="Image" descr="Image"/>
+          <p:cNvPr id="152" name="Image" descr="Image"/>
           <p:cNvPicPr>
             <a:picLocks noChangeAspect="1"/>
           </p:cNvPicPr>
           <p:nvPr/>
         </p:nvPicPr>
         <p:blipFill>
-          <a:blip r:embed="rId6">
+          <a:blip r:embed="rId7">
             <a:extLst/>
           </a:blip>
           <a:stretch>
@@ -4633,7 +5027,7 @@
       </p:pic>
       <p:sp>
         <p:nvSpPr>
-          <p:cNvPr id="150" name="Line"/>
+          <p:cNvPr id="153" name="Line"/>
           <p:cNvSpPr/>
           <p:nvPr/>
         </p:nvSpPr>
@@ -4674,7 +5068,7 @@
       </p:sp>
       <p:sp>
         <p:nvSpPr>
-          <p:cNvPr id="151" name="The contents of a package can be stored on disk as a:…"/>
+          <p:cNvPr id="154" name="The contents of a package can be stored on disk as a:…"/>
           <p:cNvSpPr txBox="1"/>
           <p:nvPr/>
         </p:nvSpPr>
@@ -4824,7 +5218,7 @@
       </p:sp>
       <p:grpSp>
         <p:nvGrpSpPr>
-          <p:cNvPr id="179" name="Group"/>
+          <p:cNvPr id="182" name="Group"/>
           <p:cNvGrpSpPr/>
           <p:nvPr/>
         </p:nvGrpSpPr>
@@ -4838,7 +5232,7 @@
         </p:grpSpPr>
         <p:grpSp>
           <p:nvGrpSpPr>
-            <p:cNvPr id="172" name="Group"/>
+            <p:cNvPr id="175" name="Group"/>
             <p:cNvGrpSpPr/>
             <p:nvPr/>
           </p:nvGrpSpPr>
@@ -4852,7 +5246,7 @@
           </p:grpSpPr>
           <p:graphicFrame>
             <p:nvGraphicFramePr>
-              <p:cNvPr id="152" name="Table"/>
+              <p:cNvPr id="155" name="Table"/>
               <p:cNvGraphicFramePr/>
               <p:nvPr/>
             </p:nvGraphicFramePr>
@@ -6772,11 +7166,7 @@
                           <a:r>
                             <a:rPr>
                               <a:solidFill>
-                                <a:schemeClr val="accent1">
-                                  <a:hueOff val="195744"/>
-                                  <a:satOff val="-47052"/>
-                                  <a:lumOff val="24890"/>
-                                </a:schemeClr>
+                                <a:srgbClr val="797979"/>
                               </a:solidFill>
                             </a:rPr>
                             <a:t>devtools::</a:t>
@@ -7092,11 +7482,7 @@
                           <a:r>
                             <a:rPr>
                               <a:solidFill>
-                                <a:schemeClr val="accent1">
-                                  <a:hueOff val="195744"/>
-                                  <a:satOff val="-47052"/>
-                                  <a:lumOff val="24890"/>
-                                </a:schemeClr>
+                                <a:srgbClr val="797979"/>
                               </a:solidFill>
                             </a:rPr>
                             <a:t>devtools::</a:t>
@@ -7416,11 +7802,7 @@
                           <a:r>
                             <a:rPr>
                               <a:solidFill>
-                                <a:schemeClr val="accent1">
-                                  <a:hueOff val="195744"/>
-                                  <a:satOff val="-47052"/>
-                                  <a:lumOff val="24890"/>
-                                </a:schemeClr>
+                                <a:srgbClr val="797979"/>
                               </a:solidFill>
                             </a:rPr>
                             <a:t>devtools::</a:t>
@@ -7740,11 +8122,7 @@
                           <a:r>
                             <a:rPr>
                               <a:solidFill>
-                                <a:schemeClr val="accent1">
-                                  <a:hueOff val="195744"/>
-                                  <a:satOff val="-47052"/>
-                                  <a:lumOff val="24890"/>
-                                </a:schemeClr>
+                                <a:srgbClr val="797979"/>
                               </a:solidFill>
                             </a:rPr>
                             <a:t>devtools::</a:t>
@@ -8895,7 +9273,7 @@
           </p:graphicFrame>
           <p:sp>
             <p:nvSpPr>
-              <p:cNvPr id="153" name="Triangle"/>
+              <p:cNvPr id="156" name="Triangle"/>
               <p:cNvSpPr/>
               <p:nvPr/>
             </p:nvSpPr>
@@ -8971,7 +9349,7 @@
           </p:sp>
           <p:sp>
             <p:nvSpPr>
-              <p:cNvPr id="154" name="Line"/>
+              <p:cNvPr id="157" name="Line"/>
               <p:cNvSpPr/>
               <p:nvPr/>
             </p:nvSpPr>
@@ -8979,150 +9357,6 @@
               <a:xfrm>
                 <a:off x="2100160" y="424450"/>
                 <a:ext cx="965103" cy="1"/>
-              </a:xfrm>
-              <a:prstGeom prst="line">
-                <a:avLst/>
-              </a:prstGeom>
-              <a:noFill/>
-              <a:ln w="12700" cap="flat">
-                <a:solidFill>
-                  <a:schemeClr val="accent1"/>
-                </a:solidFill>
-                <a:prstDash val="solid"/>
-                <a:miter lim="400000"/>
-                <a:tailEnd type="triangle" w="med" len="med"/>
-              </a:ln>
-              <a:effectLst/>
-            </p:spPr>
-            <p:txBody>
-              <a:bodyPr wrap="square" lIns="54570" tIns="54570" rIns="54570" bIns="54570" numCol="1" anchor="ctr">
-                <a:noAutofit/>
-              </a:bodyPr>
-              <a:lstStyle/>
-              <a:p>
-                <a:pPr algn="ctr">
-                  <a:spcBef>
-                    <a:spcPts val="0"/>
-                  </a:spcBef>
-                  <a:defRPr b="0" sz="2600">
-                    <a:solidFill>
-                      <a:srgbClr val="000000"/>
-                    </a:solidFill>
-                    <a:latin typeface="Helvetica Light"/>
-                    <a:ea typeface="Helvetica Light"/>
-                    <a:cs typeface="Helvetica Light"/>
-                    <a:sym typeface="Helvetica Light"/>
-                  </a:defRPr>
-                </a:pPr>
-              </a:p>
-            </p:txBody>
-          </p:sp>
-          <p:sp>
-            <p:nvSpPr>
-              <p:cNvPr id="155" name="Line"/>
-              <p:cNvSpPr/>
-              <p:nvPr/>
-            </p:nvSpPr>
-            <p:spPr>
-              <a:xfrm>
-                <a:off x="2105967" y="619912"/>
-                <a:ext cx="584103" cy="1"/>
-              </a:xfrm>
-              <a:prstGeom prst="line">
-                <a:avLst/>
-              </a:prstGeom>
-              <a:noFill/>
-              <a:ln w="12700" cap="flat">
-                <a:solidFill>
-                  <a:schemeClr val="accent1"/>
-                </a:solidFill>
-                <a:prstDash val="solid"/>
-                <a:miter lim="400000"/>
-                <a:tailEnd type="triangle" w="med" len="med"/>
-              </a:ln>
-              <a:effectLst/>
-            </p:spPr>
-            <p:txBody>
-              <a:bodyPr wrap="square" lIns="54570" tIns="54570" rIns="54570" bIns="54570" numCol="1" anchor="ctr">
-                <a:noAutofit/>
-              </a:bodyPr>
-              <a:lstStyle/>
-              <a:p>
-                <a:pPr algn="ctr">
-                  <a:spcBef>
-                    <a:spcPts val="0"/>
-                  </a:spcBef>
-                  <a:defRPr b="0" sz="2600">
-                    <a:solidFill>
-                      <a:srgbClr val="000000"/>
-                    </a:solidFill>
-                    <a:latin typeface="Helvetica Light"/>
-                    <a:ea typeface="Helvetica Light"/>
-                    <a:cs typeface="Helvetica Light"/>
-                    <a:sym typeface="Helvetica Light"/>
-                  </a:defRPr>
-                </a:pPr>
-              </a:p>
-            </p:txBody>
-          </p:sp>
-          <p:sp>
-            <p:nvSpPr>
-              <p:cNvPr id="156" name="Line"/>
-              <p:cNvSpPr/>
-              <p:nvPr/>
-            </p:nvSpPr>
-            <p:spPr>
-              <a:xfrm>
-                <a:off x="3209546" y="845769"/>
-                <a:ext cx="253903" cy="1"/>
-              </a:xfrm>
-              <a:prstGeom prst="line">
-                <a:avLst/>
-              </a:prstGeom>
-              <a:noFill/>
-              <a:ln w="12700" cap="flat">
-                <a:solidFill>
-                  <a:schemeClr val="accent1"/>
-                </a:solidFill>
-                <a:prstDash val="solid"/>
-                <a:miter lim="400000"/>
-                <a:tailEnd type="triangle" w="med" len="med"/>
-              </a:ln>
-              <a:effectLst/>
-            </p:spPr>
-            <p:txBody>
-              <a:bodyPr wrap="square" lIns="54570" tIns="54570" rIns="54570" bIns="54570" numCol="1" anchor="ctr">
-                <a:noAutofit/>
-              </a:bodyPr>
-              <a:lstStyle/>
-              <a:p>
-                <a:pPr algn="ctr">
-                  <a:spcBef>
-                    <a:spcPts val="0"/>
-                  </a:spcBef>
-                  <a:defRPr b="0" sz="2600">
-                    <a:solidFill>
-                      <a:srgbClr val="000000"/>
-                    </a:solidFill>
-                    <a:latin typeface="Helvetica Light"/>
-                    <a:ea typeface="Helvetica Light"/>
-                    <a:cs typeface="Helvetica Light"/>
-                    <a:sym typeface="Helvetica Light"/>
-                  </a:defRPr>
-                </a:pPr>
-              </a:p>
-            </p:txBody>
-          </p:sp>
-          <p:sp>
-            <p:nvSpPr>
-              <p:cNvPr id="157" name="Line"/>
-              <p:cNvSpPr/>
-              <p:nvPr/>
-            </p:nvSpPr>
-            <p:spPr>
-              <a:xfrm>
-                <a:off x="2841653" y="1052389"/>
-                <a:ext cx="622203" cy="1"/>
               </a:xfrm>
               <a:prstGeom prst="line">
                 <a:avLst/>
@@ -9169,8 +9403,8 @@
             </p:nvSpPr>
             <p:spPr>
               <a:xfrm>
-                <a:off x="2462560" y="1699566"/>
-                <a:ext cx="241203" cy="1"/>
+                <a:off x="2105967" y="619912"/>
+                <a:ext cx="584103" cy="1"/>
               </a:xfrm>
               <a:prstGeom prst="line">
                 <a:avLst/>
@@ -9217,8 +9451,8 @@
             </p:nvSpPr>
             <p:spPr>
               <a:xfrm>
-                <a:off x="2167547" y="1904599"/>
-                <a:ext cx="139603" cy="1"/>
+                <a:off x="3209546" y="845769"/>
+                <a:ext cx="253903" cy="1"/>
               </a:xfrm>
               <a:prstGeom prst="line">
                 <a:avLst/>
@@ -9264,9 +9498,9 @@
               <p:nvPr/>
             </p:nvSpPr>
             <p:spPr>
-              <a:xfrm flipV="1">
-                <a:off x="2472995" y="2122726"/>
-                <a:ext cx="1422303" cy="1"/>
+              <a:xfrm>
+                <a:off x="2841653" y="1052389"/>
+                <a:ext cx="622203" cy="1"/>
               </a:xfrm>
               <a:prstGeom prst="line">
                 <a:avLst/>
@@ -9312,9 +9546,9 @@
               <p:nvPr/>
             </p:nvSpPr>
             <p:spPr>
-              <a:xfrm flipV="1">
-                <a:off x="3609394" y="2324725"/>
-                <a:ext cx="292003" cy="1"/>
+              <a:xfrm>
+                <a:off x="2462560" y="1699566"/>
+                <a:ext cx="241203" cy="1"/>
               </a:xfrm>
               <a:prstGeom prst="line">
                 <a:avLst/>
@@ -9361,8 +9595,8 @@
             </p:nvSpPr>
             <p:spPr>
               <a:xfrm>
-                <a:off x="2470627" y="2326821"/>
-                <a:ext cx="990503" cy="1"/>
+                <a:off x="2167547" y="1904599"/>
+                <a:ext cx="139603" cy="1"/>
               </a:xfrm>
               <a:prstGeom prst="line">
                 <a:avLst/>
@@ -9408,9 +9642,9 @@
               <p:nvPr/>
             </p:nvSpPr>
             <p:spPr>
-              <a:xfrm>
-                <a:off x="3605160" y="2541521"/>
-                <a:ext cx="292003" cy="1"/>
+              <a:xfrm flipV="1">
+                <a:off x="2472995" y="2122726"/>
+                <a:ext cx="1422303" cy="1"/>
               </a:xfrm>
               <a:prstGeom prst="line">
                 <a:avLst/>
@@ -9456,9 +9690,9 @@
               <p:nvPr/>
             </p:nvSpPr>
             <p:spPr>
-              <a:xfrm>
-                <a:off x="2780011" y="695031"/>
-                <a:ext cx="1" cy="292003"/>
+              <a:xfrm flipV="1">
+                <a:off x="3609394" y="2324725"/>
+                <a:ext cx="292003" cy="1"/>
               </a:xfrm>
               <a:prstGeom prst="line">
                 <a:avLst/>
@@ -9505,8 +9739,8 @@
             </p:nvSpPr>
             <p:spPr>
               <a:xfrm>
-                <a:off x="3150028" y="480261"/>
-                <a:ext cx="1" cy="292003"/>
+                <a:off x="2470627" y="2326821"/>
+                <a:ext cx="990503" cy="1"/>
               </a:xfrm>
               <a:prstGeom prst="line">
                 <a:avLst/>
@@ -9552,9 +9786,9 @@
               <p:nvPr/>
             </p:nvSpPr>
             <p:spPr>
-              <a:xfrm flipV="1">
-                <a:off x="2784244" y="1120942"/>
-                <a:ext cx="1" cy="507903"/>
+              <a:xfrm>
+                <a:off x="3605160" y="2541521"/>
+                <a:ext cx="292003" cy="1"/>
               </a:xfrm>
               <a:prstGeom prst="line">
                 <a:avLst/>
@@ -9596,6 +9830,150 @@
           <p:sp>
             <p:nvSpPr>
               <p:cNvPr id="167" name="Line"/>
+              <p:cNvSpPr/>
+              <p:nvPr/>
+            </p:nvSpPr>
+            <p:spPr>
+              <a:xfrm>
+                <a:off x="2780011" y="695031"/>
+                <a:ext cx="1" cy="292003"/>
+              </a:xfrm>
+              <a:prstGeom prst="line">
+                <a:avLst/>
+              </a:prstGeom>
+              <a:noFill/>
+              <a:ln w="12700" cap="flat">
+                <a:solidFill>
+                  <a:schemeClr val="accent1"/>
+                </a:solidFill>
+                <a:prstDash val="solid"/>
+                <a:miter lim="400000"/>
+                <a:tailEnd type="triangle" w="med" len="med"/>
+              </a:ln>
+              <a:effectLst/>
+            </p:spPr>
+            <p:txBody>
+              <a:bodyPr wrap="square" lIns="54570" tIns="54570" rIns="54570" bIns="54570" numCol="1" anchor="ctr">
+                <a:noAutofit/>
+              </a:bodyPr>
+              <a:lstStyle/>
+              <a:p>
+                <a:pPr algn="ctr">
+                  <a:spcBef>
+                    <a:spcPts val="0"/>
+                  </a:spcBef>
+                  <a:defRPr b="0" sz="2600">
+                    <a:solidFill>
+                      <a:srgbClr val="000000"/>
+                    </a:solidFill>
+                    <a:latin typeface="Helvetica Light"/>
+                    <a:ea typeface="Helvetica Light"/>
+                    <a:cs typeface="Helvetica Light"/>
+                    <a:sym typeface="Helvetica Light"/>
+                  </a:defRPr>
+                </a:pPr>
+              </a:p>
+            </p:txBody>
+          </p:sp>
+          <p:sp>
+            <p:nvSpPr>
+              <p:cNvPr id="168" name="Line"/>
+              <p:cNvSpPr/>
+              <p:nvPr/>
+            </p:nvSpPr>
+            <p:spPr>
+              <a:xfrm>
+                <a:off x="3150028" y="480261"/>
+                <a:ext cx="1" cy="292003"/>
+              </a:xfrm>
+              <a:prstGeom prst="line">
+                <a:avLst/>
+              </a:prstGeom>
+              <a:noFill/>
+              <a:ln w="12700" cap="flat">
+                <a:solidFill>
+                  <a:schemeClr val="accent1"/>
+                </a:solidFill>
+                <a:prstDash val="solid"/>
+                <a:miter lim="400000"/>
+                <a:tailEnd type="triangle" w="med" len="med"/>
+              </a:ln>
+              <a:effectLst/>
+            </p:spPr>
+            <p:txBody>
+              <a:bodyPr wrap="square" lIns="54570" tIns="54570" rIns="54570" bIns="54570" numCol="1" anchor="ctr">
+                <a:noAutofit/>
+              </a:bodyPr>
+              <a:lstStyle/>
+              <a:p>
+                <a:pPr algn="ctr">
+                  <a:spcBef>
+                    <a:spcPts val="0"/>
+                  </a:spcBef>
+                  <a:defRPr b="0" sz="2600">
+                    <a:solidFill>
+                      <a:srgbClr val="000000"/>
+                    </a:solidFill>
+                    <a:latin typeface="Helvetica Light"/>
+                    <a:ea typeface="Helvetica Light"/>
+                    <a:cs typeface="Helvetica Light"/>
+                    <a:sym typeface="Helvetica Light"/>
+                  </a:defRPr>
+                </a:pPr>
+              </a:p>
+            </p:txBody>
+          </p:sp>
+          <p:sp>
+            <p:nvSpPr>
+              <p:cNvPr id="169" name="Line"/>
+              <p:cNvSpPr/>
+              <p:nvPr/>
+            </p:nvSpPr>
+            <p:spPr>
+              <a:xfrm flipV="1">
+                <a:off x="2784244" y="1120942"/>
+                <a:ext cx="1" cy="507903"/>
+              </a:xfrm>
+              <a:prstGeom prst="line">
+                <a:avLst/>
+              </a:prstGeom>
+              <a:noFill/>
+              <a:ln w="12700" cap="flat">
+                <a:solidFill>
+                  <a:schemeClr val="accent1"/>
+                </a:solidFill>
+                <a:prstDash val="solid"/>
+                <a:miter lim="400000"/>
+                <a:tailEnd type="triangle" w="med" len="med"/>
+              </a:ln>
+              <a:effectLst/>
+            </p:spPr>
+            <p:txBody>
+              <a:bodyPr wrap="square" lIns="54570" tIns="54570" rIns="54570" bIns="54570" numCol="1" anchor="ctr">
+                <a:noAutofit/>
+              </a:bodyPr>
+              <a:lstStyle/>
+              <a:p>
+                <a:pPr algn="ctr">
+                  <a:spcBef>
+                    <a:spcPts val="0"/>
+                  </a:spcBef>
+                  <a:defRPr b="0" sz="2600">
+                    <a:solidFill>
+                      <a:srgbClr val="000000"/>
+                    </a:solidFill>
+                    <a:latin typeface="Helvetica Light"/>
+                    <a:ea typeface="Helvetica Light"/>
+                    <a:cs typeface="Helvetica Light"/>
+                    <a:sym typeface="Helvetica Light"/>
+                  </a:defRPr>
+                </a:pPr>
+              </a:p>
+            </p:txBody>
+          </p:sp>
+          <p:sp>
+            <p:nvSpPr>
+              <p:cNvPr id="170" name="Line"/>
               <p:cNvSpPr/>
               <p:nvPr/>
             </p:nvSpPr>
@@ -9682,7 +10060,7 @@
           </p:sp>
           <p:sp>
             <p:nvSpPr>
-              <p:cNvPr id="168" name="Line"/>
+              <p:cNvPr id="171" name="Line"/>
               <p:cNvSpPr/>
               <p:nvPr/>
             </p:nvSpPr>
@@ -9729,7 +10107,7 @@
           </p:sp>
           <p:sp>
             <p:nvSpPr>
-              <p:cNvPr id="169" name="Triangle"/>
+              <p:cNvPr id="172" name="Triangle"/>
               <p:cNvSpPr/>
               <p:nvPr/>
             </p:nvSpPr>
@@ -9805,7 +10183,7 @@
           </p:sp>
           <p:sp>
             <p:nvSpPr>
-              <p:cNvPr id="170" name="Line"/>
+              <p:cNvPr id="173" name="Line"/>
               <p:cNvSpPr/>
               <p:nvPr/>
             </p:nvSpPr>
@@ -9852,7 +10230,7 @@
           </p:sp>
           <p:sp>
             <p:nvSpPr>
-              <p:cNvPr id="171" name="Triangle"/>
+              <p:cNvPr id="174" name="Triangle"/>
               <p:cNvSpPr/>
               <p:nvPr/>
             </p:nvSpPr>
@@ -9929,7 +10307,7 @@
         </p:grpSp>
         <p:sp>
           <p:nvSpPr>
-            <p:cNvPr id="173" name="Repository"/>
+            <p:cNvPr id="176" name="Repository"/>
             <p:cNvSpPr txBox="1"/>
             <p:nvPr/>
           </p:nvSpPr>
@@ -9982,7 +10360,7 @@
         </p:sp>
         <p:sp>
           <p:nvSpPr>
-            <p:cNvPr id="174" name="Source"/>
+            <p:cNvPr id="177" name="Source"/>
             <p:cNvSpPr txBox="1"/>
             <p:nvPr/>
           </p:nvSpPr>
@@ -10035,7 +10413,7 @@
         </p:sp>
         <p:sp>
           <p:nvSpPr>
-            <p:cNvPr id="175" name="Bundle"/>
+            <p:cNvPr id="178" name="Bundle"/>
             <p:cNvSpPr txBox="1"/>
             <p:nvPr/>
           </p:nvSpPr>
@@ -10088,7 +10466,7 @@
         </p:sp>
         <p:sp>
           <p:nvSpPr>
-            <p:cNvPr id="176" name="Binary"/>
+            <p:cNvPr id="179" name="Binary"/>
             <p:cNvSpPr txBox="1"/>
             <p:nvPr/>
           </p:nvSpPr>
@@ -10141,7 +10519,7 @@
         </p:sp>
         <p:sp>
           <p:nvSpPr>
-            <p:cNvPr id="177" name="Installed"/>
+            <p:cNvPr id="180" name="Installed"/>
             <p:cNvSpPr txBox="1"/>
             <p:nvPr/>
           </p:nvSpPr>
@@ -10194,7 +10572,7 @@
         </p:sp>
         <p:sp>
           <p:nvSpPr>
-            <p:cNvPr id="178" name="In memory"/>
+            <p:cNvPr id="181" name="In memory"/>
             <p:cNvSpPr txBox="1"/>
             <p:nvPr/>
           </p:nvSpPr>
@@ -10248,7 +10626,7 @@
       </p:grpSp>
       <p:sp>
         <p:nvSpPr>
-          <p:cNvPr id="180" name="A package is a convention for organizing files into directories.…"/>
+          <p:cNvPr id="183" name="A package is a convention for organizing files into directories.…"/>
           <p:cNvSpPr txBox="1"/>
           <p:nvPr/>
         </p:nvSpPr>
@@ -10329,7 +10707,7 @@
       </p:sp>
       <p:sp>
         <p:nvSpPr>
-          <p:cNvPr id="181" name=" Package…"/>
+          <p:cNvPr id="184" name=" Package…"/>
           <p:cNvSpPr txBox="1"/>
           <p:nvPr/>
         </p:nvSpPr>
@@ -10659,7 +11037,7 @@
       </p:sp>
       <p:sp>
         <p:nvSpPr>
-          <p:cNvPr id="182" name="Rectangle"/>
+          <p:cNvPr id="185" name="Rectangle"/>
           <p:cNvSpPr/>
           <p:nvPr/>
         </p:nvSpPr>
@@ -10674,11 +11052,7 @@
             </a:avLst>
           </a:prstGeom>
           <a:solidFill>
-            <a:schemeClr val="accent1">
-              <a:hueOff val="195744"/>
-              <a:satOff val="-47052"/>
-              <a:lumOff val="24890"/>
-            </a:schemeClr>
+            <a:srgbClr val="A6AAA9"/>
           </a:solidFill>
           <a:ln w="12700">
             <a:miter lim="400000"/>
@@ -10710,7 +11084,7 @@
       </p:sp>
       <p:sp>
         <p:nvSpPr>
-          <p:cNvPr id="183" name="Rectangle"/>
+          <p:cNvPr id="186" name="Rectangle"/>
           <p:cNvSpPr/>
           <p:nvPr/>
         </p:nvSpPr>
@@ -10725,11 +11099,7 @@
             </a:avLst>
           </a:prstGeom>
           <a:solidFill>
-            <a:schemeClr val="accent1">
-              <a:hueOff val="195744"/>
-              <a:satOff val="-47052"/>
-              <a:lumOff val="24890"/>
-            </a:schemeClr>
+            <a:srgbClr val="A6AAA9"/>
           </a:solidFill>
           <a:ln w="12700">
             <a:miter lim="400000"/>
@@ -10748,11 +11118,7 @@
               </a:spcBef>
               <a:defRPr b="0">
                 <a:solidFill>
-                  <a:schemeClr val="accent1">
-                    <a:hueOff val="195744"/>
-                    <a:satOff val="-47052"/>
-                    <a:lumOff val="24890"/>
-                  </a:schemeClr>
+                  <a:srgbClr val="797979"/>
                 </a:solidFill>
               </a:defRPr>
             </a:pPr>
@@ -10761,7 +11127,7 @@
       </p:sp>
       <p:sp>
         <p:nvSpPr>
-          <p:cNvPr id="184" name="Rectangle"/>
+          <p:cNvPr id="187" name="Rectangle"/>
           <p:cNvSpPr/>
           <p:nvPr/>
         </p:nvSpPr>
@@ -10776,11 +11142,7 @@
             </a:avLst>
           </a:prstGeom>
           <a:solidFill>
-            <a:schemeClr val="accent1">
-              <a:hueOff val="195744"/>
-              <a:satOff val="-47052"/>
-              <a:lumOff val="24890"/>
-            </a:schemeClr>
+            <a:srgbClr val="A6AAA9"/>
           </a:solidFill>
           <a:ln w="12700">
             <a:miter lim="400000"/>
@@ -10799,11 +11161,7 @@
               </a:spcBef>
               <a:defRPr b="0">
                 <a:solidFill>
-                  <a:schemeClr val="accent1">
-                    <a:hueOff val="195744"/>
-                    <a:satOff val="-47052"/>
-                    <a:lumOff val="24890"/>
-                  </a:schemeClr>
+                  <a:srgbClr val="797979"/>
                 </a:solidFill>
               </a:defRPr>
             </a:pPr>
@@ -10812,7 +11170,7 @@
       </p:sp>
       <p:sp>
         <p:nvSpPr>
-          <p:cNvPr id="185" name="Rectangle"/>
+          <p:cNvPr id="188" name="Rectangle"/>
           <p:cNvSpPr/>
           <p:nvPr/>
         </p:nvSpPr>
@@ -10827,11 +11185,7 @@
             </a:avLst>
           </a:prstGeom>
           <a:solidFill>
-            <a:schemeClr val="accent1">
-              <a:hueOff val="195744"/>
-              <a:satOff val="-47052"/>
-              <a:lumOff val="24890"/>
-            </a:schemeClr>
+            <a:srgbClr val="A6AAA9"/>
           </a:solidFill>
           <a:ln w="12700">
             <a:miter lim="400000"/>
@@ -10850,11 +11204,7 @@
               </a:spcBef>
               <a:defRPr b="0">
                 <a:solidFill>
-                  <a:schemeClr val="accent1">
-                    <a:hueOff val="195744"/>
-                    <a:satOff val="-47052"/>
-                    <a:lumOff val="24890"/>
-                  </a:schemeClr>
+                  <a:srgbClr val="797979"/>
                 </a:solidFill>
               </a:defRPr>
             </a:pPr>
@@ -10863,7 +11213,7 @@
       </p:sp>
       <p:sp>
         <p:nvSpPr>
-          <p:cNvPr id="186" name="Rectangle"/>
+          <p:cNvPr id="189" name="Rectangle"/>
           <p:cNvSpPr/>
           <p:nvPr/>
         </p:nvSpPr>
@@ -10878,11 +11228,7 @@
             </a:avLst>
           </a:prstGeom>
           <a:solidFill>
-            <a:schemeClr val="accent1">
-              <a:hueOff val="195744"/>
-              <a:satOff val="-47052"/>
-              <a:lumOff val="24890"/>
-            </a:schemeClr>
+            <a:srgbClr val="A6AAA9"/>
           </a:solidFill>
           <a:ln w="12700">
             <a:miter lim="400000"/>
@@ -10901,11 +11247,7 @@
               </a:spcBef>
               <a:defRPr b="0">
                 <a:solidFill>
-                  <a:schemeClr val="accent1">
-                    <a:hueOff val="195744"/>
-                    <a:satOff val="-47052"/>
-                    <a:lumOff val="24890"/>
-                  </a:schemeClr>
+                  <a:srgbClr val="797979"/>
                 </a:solidFill>
               </a:defRPr>
             </a:pPr>
@@ -10914,7 +11256,7 @@
       </p:sp>
       <p:sp>
         <p:nvSpPr>
-          <p:cNvPr id="187" name="Rectangle"/>
+          <p:cNvPr id="190" name="Rectangle"/>
           <p:cNvSpPr/>
           <p:nvPr/>
         </p:nvSpPr>
@@ -10929,11 +11271,7 @@
             </a:avLst>
           </a:prstGeom>
           <a:solidFill>
-            <a:schemeClr val="accent1">
-              <a:hueOff val="195744"/>
-              <a:satOff val="-47052"/>
-              <a:lumOff val="24890"/>
-            </a:schemeClr>
+            <a:srgbClr val="A6AAA9"/>
           </a:solidFill>
           <a:ln w="12700">
             <a:miter lim="400000"/>
@@ -10952,11 +11290,7 @@
               </a:spcBef>
               <a:defRPr b="0">
                 <a:solidFill>
-                  <a:schemeClr val="accent1">
-                    <a:hueOff val="195744"/>
-                    <a:satOff val="-47052"/>
-                    <a:lumOff val="24890"/>
-                  </a:schemeClr>
+                  <a:srgbClr val="797979"/>
                 </a:solidFill>
               </a:defRPr>
             </a:pPr>
@@ -10965,7 +11299,7 @@
       </p:sp>
       <p:sp>
         <p:nvSpPr>
-          <p:cNvPr id="188" name="Rectangle"/>
+          <p:cNvPr id="191" name="Rectangle"/>
           <p:cNvSpPr/>
           <p:nvPr/>
         </p:nvSpPr>
@@ -10980,11 +11314,7 @@
             </a:avLst>
           </a:prstGeom>
           <a:solidFill>
-            <a:schemeClr val="accent1">
-              <a:hueOff val="195744"/>
-              <a:satOff val="-47052"/>
-              <a:lumOff val="24890"/>
-            </a:schemeClr>
+            <a:srgbClr val="A6AAA9"/>
           </a:solidFill>
           <a:ln w="12700">
             <a:miter lim="400000"/>
@@ -11003,11 +11333,7 @@
               </a:spcBef>
               <a:defRPr b="0">
                 <a:solidFill>
-                  <a:schemeClr val="accent1">
-                    <a:hueOff val="195744"/>
-                    <a:satOff val="-47052"/>
-                    <a:lumOff val="24890"/>
-                  </a:schemeClr>
+                  <a:srgbClr val="797979"/>
                 </a:solidFill>
               </a:defRPr>
             </a:pPr>
@@ -11016,7 +11342,7 @@
       </p:sp>
       <p:sp>
         <p:nvSpPr>
-          <p:cNvPr id="189" name="devtools::use_build_ignore(&quot;file&quot;)…"/>
+          <p:cNvPr id="192" name="devtools::use_build_ignore(&quot;file&quot;)…"/>
           <p:cNvSpPr txBox="1"/>
           <p:nvPr/>
         </p:nvSpPr>
@@ -11059,11 +11385,7 @@
             <a:r>
               <a:rPr>
                 <a:solidFill>
-                  <a:schemeClr val="accent1">
-                    <a:hueOff val="195744"/>
-                    <a:satOff val="-47052"/>
-                    <a:lumOff val="24890"/>
-                  </a:schemeClr>
+                  <a:srgbClr val="797979"/>
                 </a:solidFill>
               </a:rPr>
               <a:t>devtools::</a:t>
@@ -11104,7 +11426,7 @@
       </p:sp>
       <p:sp>
         <p:nvSpPr>
-          <p:cNvPr id="190" name="SETUP"/>
+          <p:cNvPr id="193" name="SETUP"/>
           <p:cNvSpPr txBox="1"/>
           <p:nvPr/>
         </p:nvSpPr>
@@ -11146,7 +11468,7 @@
       </p:sp>
       <p:sp>
         <p:nvSpPr>
-          <p:cNvPr id="191" name="WRITE CODE"/>
+          <p:cNvPr id="194" name="WRITE CODE"/>
           <p:cNvSpPr txBox="1"/>
           <p:nvPr/>
         </p:nvSpPr>
@@ -11188,7 +11510,7 @@
       </p:sp>
       <p:sp>
         <p:nvSpPr>
-          <p:cNvPr id="192" name="TEST"/>
+          <p:cNvPr id="195" name="TEST"/>
           <p:cNvSpPr txBox="1"/>
           <p:nvPr/>
         </p:nvSpPr>
@@ -11230,7 +11552,7 @@
       </p:sp>
       <p:sp>
         <p:nvSpPr>
-          <p:cNvPr id="193" name="DOCUMENT"/>
+          <p:cNvPr id="196" name="DOCUMENT"/>
           <p:cNvSpPr txBox="1"/>
           <p:nvPr/>
         </p:nvSpPr>
@@ -11272,7 +11594,7 @@
       </p:sp>
       <p:sp>
         <p:nvSpPr>
-          <p:cNvPr id="194" name="TEACH"/>
+          <p:cNvPr id="197" name="TEACH"/>
           <p:cNvSpPr txBox="1"/>
           <p:nvPr/>
         </p:nvSpPr>
@@ -11314,7 +11636,7 @@
       </p:sp>
       <p:sp>
         <p:nvSpPr>
-          <p:cNvPr id="195" name="ADD DATA"/>
+          <p:cNvPr id="198" name="ADD DATA"/>
           <p:cNvSpPr txBox="1"/>
           <p:nvPr/>
         </p:nvSpPr>
@@ -11356,7 +11678,7 @@
       </p:sp>
       <p:sp>
         <p:nvSpPr>
-          <p:cNvPr id="196" name="ORGANIZE"/>
+          <p:cNvPr id="199" name="ORGANIZE"/>
           <p:cNvSpPr txBox="1"/>
           <p:nvPr/>
         </p:nvSpPr>
@@ -11398,7 +11720,7 @@
       </p:sp>
       <p:sp>
         <p:nvSpPr>
-          <p:cNvPr id="197" name="You must have a DESCRIPTION file…"/>
+          <p:cNvPr id="200" name="You must have a DESCRIPTION file…"/>
           <p:cNvSpPr txBox="1"/>
           <p:nvPr/>
         </p:nvSpPr>
@@ -11477,11 +11799,7 @@
             <a:r>
               <a:rPr>
                 <a:solidFill>
-                  <a:schemeClr val="accent1">
-                    <a:hueOff val="195744"/>
-                    <a:satOff val="-47052"/>
-                    <a:lumOff val="24890"/>
-                  </a:schemeClr>
+                  <a:srgbClr val="797979"/>
                 </a:solidFill>
               </a:rPr>
               <a:t>devtools::</a:t>
@@ -11513,7 +11831,7 @@
       </p:sp>
       <p:sp>
         <p:nvSpPr>
-          <p:cNvPr id="198" name=""/>
+          <p:cNvPr id="201" name=""/>
           <p:cNvSpPr txBox="1"/>
           <p:nvPr/>
         </p:nvSpPr>
@@ -11545,11 +11863,7 @@
               </a:spcBef>
               <a:defRPr b="0" sz="2400">
                 <a:solidFill>
-                  <a:schemeClr val="accent1">
-                    <a:hueOff val="195744"/>
-                    <a:satOff val="-47052"/>
-                    <a:lumOff val="24890"/>
-                  </a:schemeClr>
+                  <a:srgbClr val="797979"/>
                 </a:solidFill>
                 <a:latin typeface="FontAwesome"/>
                 <a:ea typeface="FontAwesome"/>
@@ -11568,7 +11882,7 @@
       </p:sp>
       <p:sp>
         <p:nvSpPr>
-          <p:cNvPr id="199" name=""/>
+          <p:cNvPr id="202" name=""/>
           <p:cNvSpPr txBox="1"/>
           <p:nvPr/>
         </p:nvSpPr>
@@ -11600,11 +11914,7 @@
               </a:spcBef>
               <a:defRPr b="0" sz="2400">
                 <a:solidFill>
-                  <a:schemeClr val="accent1">
-                    <a:hueOff val="195744"/>
-                    <a:satOff val="-47052"/>
-                    <a:lumOff val="24890"/>
-                  </a:schemeClr>
+                  <a:srgbClr val="797979"/>
                 </a:solidFill>
                 <a:latin typeface="FontAwesome"/>
                 <a:ea typeface="FontAwesome"/>
@@ -11623,323 +11933,7 @@
       </p:sp>
       <p:sp>
         <p:nvSpPr>
-          <p:cNvPr id="200" name="Package: mypackage…"/>
-          <p:cNvSpPr/>
-          <p:nvPr/>
-        </p:nvSpPr>
-        <p:spPr>
-          <a:xfrm>
-            <a:off x="9537889" y="1899237"/>
-            <a:ext cx="4027542" cy="2077541"/>
-          </a:xfrm>
-          <a:prstGeom prst="rect">
-            <a:avLst/>
-          </a:prstGeom>
-          <a:solidFill>
-            <a:srgbClr val="FFFFFF"/>
-          </a:solidFill>
-          <a:ln w="12700">
-            <a:solidFill>
-              <a:srgbClr val="53585F"/>
-            </a:solidFill>
-            <a:miter lim="400000"/>
-          </a:ln>
-          <a:effectLst>
-            <a:outerShdw sx="100000" sy="100000" kx="0" ky="0" algn="b" rotWithShape="0" blurRad="38100" dist="25400" dir="5400000">
-              <a:srgbClr val="000000">
-                <a:alpha val="50000"/>
-              </a:srgbClr>
-            </a:outerShdw>
-          </a:effectLst>
-          <a:extLst>
-            <a:ext uri="{C572A759-6A51-4108-AA02-DFA0A04FC94B}">
-              <ma14:wrappingTextBoxFlag xmlns:ma14="http://schemas.microsoft.com/office/mac/drawingml/2011/main" val="1"/>
-            </a:ext>
-          </a:extLst>
-        </p:spPr>
-        <p:txBody>
-          <a:bodyPr lIns="54570" tIns="54570" rIns="54570" bIns="54570" anchor="ctr"/>
-          <a:lstStyle/>
-          <a:p>
-            <a:pPr>
-              <a:spcBef>
-                <a:spcPts val="0"/>
-              </a:spcBef>
-              <a:defRPr b="0" sz="950">
-                <a:solidFill>
-                  <a:srgbClr val="000000"/>
-                </a:solidFill>
-                <a:latin typeface="Menlo"/>
-                <a:ea typeface="Menlo"/>
-                <a:cs typeface="Menlo"/>
-                <a:sym typeface="Menlo"/>
-              </a:defRPr>
-            </a:pPr>
-            <a:r>
-              <a:t>Package: mypackage</a:t>
-            </a:r>
-          </a:p>
-          <a:p>
-            <a:pPr>
-              <a:spcBef>
-                <a:spcPts val="0"/>
-              </a:spcBef>
-              <a:defRPr b="0" sz="950">
-                <a:solidFill>
-                  <a:srgbClr val="000000"/>
-                </a:solidFill>
-                <a:latin typeface="Menlo"/>
-                <a:ea typeface="Menlo"/>
-                <a:cs typeface="Menlo"/>
-                <a:sym typeface="Menlo"/>
-              </a:defRPr>
-            </a:pPr>
-            <a:r>
-              <a:t>Title: Title of Package</a:t>
-            </a:r>
-          </a:p>
-          <a:p>
-            <a:pPr>
-              <a:spcBef>
-                <a:spcPts val="0"/>
-              </a:spcBef>
-              <a:defRPr b="0" sz="950">
-                <a:solidFill>
-                  <a:srgbClr val="000000"/>
-                </a:solidFill>
-                <a:latin typeface="Menlo"/>
-                <a:ea typeface="Menlo"/>
-                <a:cs typeface="Menlo"/>
-                <a:sym typeface="Menlo"/>
-              </a:defRPr>
-            </a:pPr>
-            <a:r>
-              <a:t>Version: 0.1.0</a:t>
-            </a:r>
-          </a:p>
-          <a:p>
-            <a:pPr>
-              <a:spcBef>
-                <a:spcPts val="0"/>
-              </a:spcBef>
-              <a:defRPr b="0" sz="950">
-                <a:solidFill>
-                  <a:srgbClr val="000000"/>
-                </a:solidFill>
-                <a:latin typeface="Menlo"/>
-                <a:ea typeface="Menlo"/>
-                <a:cs typeface="Menlo"/>
-                <a:sym typeface="Menlo"/>
-              </a:defRPr>
-            </a:pPr>
-            <a:r>
-              <a:t>Authors@R: person("Hadley", "Wickham", email = </a:t>
-            </a:r>
-          </a:p>
-          <a:p>
-            <a:pPr>
-              <a:spcBef>
-                <a:spcPts val="0"/>
-              </a:spcBef>
-              <a:defRPr b="0" sz="950">
-                <a:solidFill>
-                  <a:srgbClr val="000000"/>
-                </a:solidFill>
-                <a:latin typeface="Menlo"/>
-                <a:ea typeface="Menlo"/>
-                <a:cs typeface="Menlo"/>
-                <a:sym typeface="Menlo"/>
-              </a:defRPr>
-            </a:pPr>
-            <a:r>
-              <a:t>    "</a:t>
-            </a:r>
-            <a:r>
-              <a:rPr u="sng">
-                <a:hlinkClick r:id="rId7" invalidUrl="" action="" tgtFrame="" tooltip="" history="1" highlightClick="0" endSnd="0"/>
-              </a:rPr>
-              <a:t>hadley@me.com</a:t>
-            </a:r>
-            <a:r>
-              <a:t>", role = c("aut", "cre"))</a:t>
-            </a:r>
-          </a:p>
-          <a:p>
-            <a:pPr>
-              <a:spcBef>
-                <a:spcPts val="0"/>
-              </a:spcBef>
-              <a:defRPr b="0" sz="950">
-                <a:solidFill>
-                  <a:srgbClr val="000000"/>
-                </a:solidFill>
-                <a:latin typeface="Menlo"/>
-                <a:ea typeface="Menlo"/>
-                <a:cs typeface="Menlo"/>
-                <a:sym typeface="Menlo"/>
-              </a:defRPr>
-            </a:pPr>
-            <a:r>
-              <a:t>Description: What the package does (one paragraph)</a:t>
-            </a:r>
-          </a:p>
-          <a:p>
-            <a:pPr>
-              <a:spcBef>
-                <a:spcPts val="0"/>
-              </a:spcBef>
-              <a:defRPr b="0" sz="950">
-                <a:solidFill>
-                  <a:srgbClr val="000000"/>
-                </a:solidFill>
-                <a:latin typeface="Menlo"/>
-                <a:ea typeface="Menlo"/>
-                <a:cs typeface="Menlo"/>
-                <a:sym typeface="Menlo"/>
-              </a:defRPr>
-            </a:pPr>
-            <a:r>
-              <a:t>Depends: R (&gt;= 3.1.0)</a:t>
-            </a:r>
-          </a:p>
-          <a:p>
-            <a:pPr>
-              <a:spcBef>
-                <a:spcPts val="0"/>
-              </a:spcBef>
-              <a:defRPr b="0" sz="950">
-                <a:solidFill>
-                  <a:srgbClr val="000000"/>
-                </a:solidFill>
-                <a:latin typeface="Menlo"/>
-                <a:ea typeface="Menlo"/>
-                <a:cs typeface="Menlo"/>
-                <a:sym typeface="Menlo"/>
-              </a:defRPr>
-            </a:pPr>
-            <a:r>
-              <a:t>License: GPL-2</a:t>
-            </a:r>
-          </a:p>
-          <a:p>
-            <a:pPr>
-              <a:spcBef>
-                <a:spcPts val="0"/>
-              </a:spcBef>
-              <a:defRPr b="0" sz="950">
-                <a:solidFill>
-                  <a:srgbClr val="000000"/>
-                </a:solidFill>
-                <a:latin typeface="Menlo"/>
-                <a:ea typeface="Menlo"/>
-                <a:cs typeface="Menlo"/>
-                <a:sym typeface="Menlo"/>
-              </a:defRPr>
-            </a:pPr>
-            <a:r>
-              <a:t>LazyData: true</a:t>
-            </a:r>
-          </a:p>
-          <a:p>
-            <a:pPr>
-              <a:spcBef>
-                <a:spcPts val="0"/>
-              </a:spcBef>
-              <a:defRPr b="0" sz="950">
-                <a:solidFill>
-                  <a:srgbClr val="000000"/>
-                </a:solidFill>
-                <a:latin typeface="Menlo"/>
-                <a:ea typeface="Menlo"/>
-                <a:cs typeface="Menlo"/>
-                <a:sym typeface="Menlo"/>
-              </a:defRPr>
-            </a:pPr>
-            <a:r>
-              <a:t>Imports: </a:t>
-            </a:r>
-          </a:p>
-          <a:p>
-            <a:pPr>
-              <a:spcBef>
-                <a:spcPts val="0"/>
-              </a:spcBef>
-              <a:defRPr b="0" sz="950">
-                <a:solidFill>
-                  <a:srgbClr val="000000"/>
-                </a:solidFill>
-                <a:latin typeface="Menlo"/>
-                <a:ea typeface="Menlo"/>
-                <a:cs typeface="Menlo"/>
-                <a:sym typeface="Menlo"/>
-              </a:defRPr>
-            </a:pPr>
-            <a:r>
-              <a:t>    dplyr (&gt;= 0.4.0),</a:t>
-            </a:r>
-          </a:p>
-          <a:p>
-            <a:pPr>
-              <a:spcBef>
-                <a:spcPts val="0"/>
-              </a:spcBef>
-              <a:defRPr b="0" sz="950">
-                <a:solidFill>
-                  <a:srgbClr val="000000"/>
-                </a:solidFill>
-                <a:latin typeface="Menlo"/>
-                <a:ea typeface="Menlo"/>
-                <a:cs typeface="Menlo"/>
-                <a:sym typeface="Menlo"/>
-              </a:defRPr>
-            </a:pPr>
-            <a:r>
-              <a:t>    ggvis (&gt;= 0.2)</a:t>
-            </a:r>
-          </a:p>
-          <a:p>
-            <a:pPr>
-              <a:spcBef>
-                <a:spcPts val="0"/>
-              </a:spcBef>
-              <a:defRPr b="0" sz="950">
-                <a:solidFill>
-                  <a:srgbClr val="000000"/>
-                </a:solidFill>
-                <a:latin typeface="Menlo"/>
-                <a:ea typeface="Menlo"/>
-                <a:cs typeface="Menlo"/>
-                <a:sym typeface="Menlo"/>
-              </a:defRPr>
-            </a:pPr>
-            <a:r>
-              <a:t>Suggests:</a:t>
-            </a:r>
-          </a:p>
-          <a:p>
-            <a:pPr>
-              <a:spcBef>
-                <a:spcPts val="0"/>
-              </a:spcBef>
-              <a:defRPr b="0" sz="950">
-                <a:solidFill>
-                  <a:srgbClr val="000000"/>
-                </a:solidFill>
-                <a:latin typeface="Menlo"/>
-                <a:ea typeface="Menlo"/>
-                <a:cs typeface="Menlo"/>
-                <a:sym typeface="Menlo"/>
-              </a:defRPr>
-            </a:pPr>
-            <a:r>
-              <a:t>    knitr (&gt;= 0.1.0)</a:t>
-            </a:r>
-          </a:p>
-        </p:txBody>
-      </p:sp>
-      <p:sp>
-        <p:nvSpPr>
-          <p:cNvPr id="201" name="MIT license applies to your code if re-shared."/>
+          <p:cNvPr id="203" name="MIT license applies to your code if re-shared."/>
           <p:cNvSpPr txBox="1"/>
           <p:nvPr/>
         </p:nvSpPr>
@@ -11989,7 +11983,7 @@
       </p:sp>
       <p:sp>
         <p:nvSpPr>
-          <p:cNvPr id="202" name="MIT"/>
+          <p:cNvPr id="204" name="MIT"/>
           <p:cNvSpPr txBox="1"/>
           <p:nvPr/>
         </p:nvSpPr>
@@ -12036,7 +12030,7 @@
       </p:sp>
       <p:sp>
         <p:nvSpPr>
-          <p:cNvPr id="203" name="Visit r-pkgs.had.co.nz to learn much more about writing and publishing packages for R"/>
+          <p:cNvPr id="205" name="Visit r-pkgs.had.co.nz to learn much more about writing and publishing packages for R"/>
           <p:cNvSpPr/>
           <p:nvPr/>
         </p:nvSpPr>
@@ -12113,7 +12107,7 @@
       </p:sp>
       <p:sp>
         <p:nvSpPr>
-          <p:cNvPr id="204" name="All of the R code in your package goes in  R/. A package with just an R/ directory is still a very useful package."/>
+          <p:cNvPr id="206" name="All of the R code in your package goes in  R/. A package with just an R/ directory is still a very useful package."/>
           <p:cNvSpPr txBox="1"/>
           <p:nvPr/>
         </p:nvSpPr>
@@ -12176,7 +12170,7 @@
       </p:sp>
       <p:sp>
         <p:nvSpPr>
-          <p:cNvPr id="205" name="Create a new package project with…"/>
+          <p:cNvPr id="207" name="Create a new package project with…"/>
           <p:cNvSpPr txBox="1"/>
           <p:nvPr/>
         </p:nvSpPr>
@@ -12237,7 +12231,7 @@
             <a:r>
               <a:rPr>
                 <a:solidFill>
-                  <a:schemeClr val="accent1"/>
+                  <a:srgbClr val="797979"/>
                 </a:solidFill>
               </a:rPr>
               <a:t>devtools::</a:t>
@@ -12343,7 +12337,7 @@
       </p:sp>
       <p:sp>
         <p:nvSpPr>
-          <p:cNvPr id="206" name="1. Edit your code.…"/>
+          <p:cNvPr id="208" name="1. Edit your code.…"/>
           <p:cNvSpPr txBox="1"/>
           <p:nvPr/>
         </p:nvSpPr>
@@ -12446,11 +12440,7 @@
             <a:r>
               <a:rPr>
                 <a:solidFill>
-                  <a:schemeClr val="accent1">
-                    <a:hueOff val="195744"/>
-                    <a:satOff val="-47052"/>
-                    <a:lumOff val="24890"/>
-                  </a:schemeClr>
+                  <a:srgbClr val="797979"/>
                 </a:solidFill>
               </a:rPr>
               <a:t>devtools::</a:t>
@@ -12529,30 +12519,10 @@
             <a:r>
               <a:rPr>
                 <a:solidFill>
-                  <a:schemeClr val="accent1"/>
+                  <a:srgbClr val="797979"/>
                 </a:solidFill>
               </a:rPr>
-              <a:t>(</a:t>
-            </a:r>
-            <a:r>
-              <a:rPr>
-                <a:solidFill>
-                  <a:schemeClr val="accent1">
-                    <a:hueOff val="195744"/>
-                    <a:satOff val="-47052"/>
-                    <a:lumOff val="24890"/>
-                  </a:schemeClr>
-                </a:solidFill>
-              </a:rPr>
-              <a:t>keyboard shortcut</a:t>
-            </a:r>
-            <a:r>
-              <a:rPr>
-                <a:solidFill>
-                  <a:schemeClr val="accent1"/>
-                </a:solidFill>
-              </a:rPr>
-              <a:t>)</a:t>
+              <a:t>(keyboard shortcut)</a:t>
             </a:r>
           </a:p>
           <a:p>
@@ -12634,7 +12604,7 @@
       </p:sp>
       <p:sp>
         <p:nvSpPr>
-          <p:cNvPr id="207" name=""/>
+          <p:cNvPr id="209" name=""/>
           <p:cNvSpPr txBox="1"/>
           <p:nvPr/>
         </p:nvSpPr>
@@ -12666,11 +12636,7 @@
               </a:spcBef>
               <a:defRPr b="0" sz="2400">
                 <a:solidFill>
-                  <a:schemeClr val="accent1">
-                    <a:hueOff val="195744"/>
-                    <a:satOff val="-47052"/>
-                    <a:lumOff val="24890"/>
-                  </a:schemeClr>
+                  <a:srgbClr val="797979"/>
                 </a:solidFill>
                 <a:latin typeface="FontAwesome"/>
                 <a:ea typeface="FontAwesome"/>
@@ -12689,7 +12655,7 @@
       </p:sp>
       <p:sp>
         <p:nvSpPr>
-          <p:cNvPr id="208" name=""/>
+          <p:cNvPr id="210" name=""/>
           <p:cNvSpPr txBox="1"/>
           <p:nvPr/>
         </p:nvSpPr>
@@ -12721,11 +12687,7 @@
               </a:spcBef>
               <a:defRPr b="0" sz="2400">
                 <a:solidFill>
-                  <a:schemeClr val="accent1">
-                    <a:hueOff val="195744"/>
-                    <a:satOff val="-47052"/>
-                    <a:lumOff val="24890"/>
-                  </a:schemeClr>
+                  <a:srgbClr val="797979"/>
                 </a:solidFill>
                 <a:latin typeface="FontAwesome"/>
                 <a:ea typeface="FontAwesome"/>
@@ -12744,7 +12706,7 @@
       </p:sp>
       <p:sp>
         <p:nvSpPr>
-          <p:cNvPr id="209" name="Use consistent style with r-pkgs.had.co.nz/r.html#style…"/>
+          <p:cNvPr id="211" name="Use consistent style with r-pkgs.had.co.nz/r.html#style…"/>
           <p:cNvSpPr txBox="1"/>
           <p:nvPr/>
         </p:nvSpPr>
@@ -12846,102 +12808,6 @@
             </a:r>
             <a:r>
               <a:t>Ctrl + .</a:t>
-            </a:r>
-          </a:p>
-        </p:txBody>
-      </p:sp>
-      <p:sp>
-        <p:nvSpPr>
-          <p:cNvPr id="210" name="Rounded Rectangle"/>
-          <p:cNvSpPr/>
-          <p:nvPr/>
-        </p:nvSpPr>
-        <p:spPr>
-          <a:xfrm>
-            <a:off x="11429834" y="3426118"/>
-            <a:ext cx="2098600" cy="515542"/>
-          </a:xfrm>
-          <a:prstGeom prst="roundRect">
-            <a:avLst>
-              <a:gd name="adj" fmla="val 6231"/>
-            </a:avLst>
-          </a:prstGeom>
-          <a:solidFill>
-            <a:srgbClr val="DCDEE0"/>
-          </a:solidFill>
-          <a:ln w="12700">
-            <a:miter lim="400000"/>
-          </a:ln>
-        </p:spPr>
-        <p:txBody>
-          <a:bodyPr lIns="54570" tIns="54570" rIns="54570" bIns="54570" anchor="ctr"/>
-          <a:lstStyle/>
-          <a:p>
-            <a:pPr>
-              <a:spcBef>
-                <a:spcPts val="0"/>
-              </a:spcBef>
-              <a:defRPr b="0" sz="1000">
-                <a:solidFill>
-                  <a:srgbClr val="000000"/>
-                </a:solidFill>
-                <a:latin typeface="Menlo"/>
-                <a:ea typeface="Menlo"/>
-                <a:cs typeface="Menlo"/>
-                <a:sym typeface="Menlo"/>
-              </a:defRPr>
-            </a:pPr>
-          </a:p>
-        </p:txBody>
-      </p:sp>
-      <p:sp>
-        <p:nvSpPr>
-          <p:cNvPr id="211" name="Suggest packages that are not very essential to yours. Users can install them manually, or not, as they like."/>
-          <p:cNvSpPr txBox="1"/>
-          <p:nvPr/>
-        </p:nvSpPr>
-        <p:spPr>
-          <a:xfrm>
-            <a:off x="11392977" y="3346368"/>
-            <a:ext cx="2136408" cy="629689"/>
-          </a:xfrm>
-          <a:prstGeom prst="rect">
-            <a:avLst/>
-          </a:prstGeom>
-          <a:ln w="12700">
-            <a:miter lim="400000"/>
-          </a:ln>
-          <a:extLst>
-            <a:ext uri="{C572A759-6A51-4108-AA02-DFA0A04FC94B}">
-              <ma14:wrappingTextBoxFlag xmlns:ma14="http://schemas.microsoft.com/office/mac/drawingml/2011/main" val="1"/>
-            </a:ext>
-          </a:extLst>
-        </p:spPr>
-        <p:txBody>
-          <a:bodyPr lIns="54570" tIns="54570" rIns="54570" bIns="54570" anchor="ctr">
-            <a:normAutofit fontScale="100000" lnSpcReduction="0"/>
-          </a:bodyPr>
-          <a:lstStyle/>
-          <a:p>
-            <a:pPr>
-              <a:lnSpc>
-                <a:spcPct val="90000"/>
-              </a:lnSpc>
-              <a:spcBef>
-                <a:spcPts val="300"/>
-              </a:spcBef>
-              <a:defRPr b="0" sz="1000">
-                <a:solidFill>
-                  <a:srgbClr val="000000"/>
-                </a:solidFill>
-              </a:defRPr>
-            </a:pPr>
-            <a:r>
-              <a:rPr b="1"/>
-              <a:t>Suggest</a:t>
-            </a:r>
-            <a:r>
-              <a:t> packages that are not very essential to yours. Users can install them manually, or not, as they like.</a:t>
             </a:r>
           </a:p>
         </p:txBody>
@@ -13391,7 +13257,7 @@
               </a:spcBef>
               <a:defRPr b="0" sz="2500">
                 <a:solidFill>
-                  <a:srgbClr val="628DB5"/>
+                  <a:srgbClr val="797979"/>
                 </a:solidFill>
               </a:defRPr>
             </a:pPr>
@@ -14746,11 +14612,7 @@
             <a:pPr lvl="1" indent="0">
               <a:defRPr>
                 <a:solidFill>
-                  <a:schemeClr val="accent1">
-                    <a:hueOff val="195744"/>
-                    <a:satOff val="-47052"/>
-                    <a:lumOff val="24890"/>
-                  </a:schemeClr>
+                  <a:srgbClr val="797979"/>
                 </a:solidFill>
               </a:defRPr>
             </a:pPr>
@@ -14873,11 +14735,7 @@
               </a:spcBef>
               <a:defRPr b="0" sz="2400">
                 <a:solidFill>
-                  <a:schemeClr val="accent1">
-                    <a:hueOff val="195744"/>
-                    <a:satOff val="-47052"/>
-                    <a:lumOff val="24890"/>
-                  </a:schemeClr>
+                  <a:srgbClr val="797979"/>
                 </a:solidFill>
                 <a:latin typeface="FontAwesome"/>
                 <a:ea typeface="FontAwesome"/>
@@ -14932,7 +14790,7 @@
               </a:spcBef>
               <a:defRPr b="0" sz="2500">
                 <a:solidFill>
-                  <a:srgbClr val="628DB5"/>
+                  <a:srgbClr val="797979"/>
                 </a:solidFill>
               </a:defRPr>
             </a:pPr>
@@ -15113,9 +14971,38 @@
           <a:chExt cx="0" cy="0"/>
         </a:xfrm>
       </p:grpSpPr>
+      <p:pic>
+        <p:nvPicPr>
+          <p:cNvPr id="233" name="Image" descr="Image"/>
+          <p:cNvPicPr>
+            <a:picLocks noChangeAspect="1"/>
+          </p:cNvPicPr>
+          <p:nvPr/>
+        </p:nvPicPr>
+        <p:blipFill>
+          <a:blip r:embed="rId2">
+            <a:extLst/>
+          </a:blip>
+          <a:stretch>
+            <a:fillRect/>
+          </a:stretch>
+        </p:blipFill>
+        <p:spPr>
+          <a:xfrm>
+            <a:off x="8369105" y="-684523"/>
+            <a:ext cx="5603817" cy="2992964"/>
+          </a:xfrm>
+          <a:prstGeom prst="rect">
+            <a:avLst/>
+          </a:prstGeom>
+          <a:ln w="12700">
+            <a:miter lim="400000"/>
+          </a:ln>
+        </p:spPr>
+      </p:pic>
       <p:sp>
         <p:nvSpPr>
-          <p:cNvPr id="233" name="Line"/>
+          <p:cNvPr id="234" name="Line"/>
           <p:cNvSpPr/>
           <p:nvPr/>
         </p:nvSpPr>
@@ -15158,7 +15045,7 @@
       </p:sp>
       <p:sp>
         <p:nvSpPr>
-          <p:cNvPr id="234" name="Rectangle"/>
+          <p:cNvPr id="235" name="Rectangle"/>
           <p:cNvSpPr/>
           <p:nvPr/>
         </p:nvSpPr>
@@ -15178,7 +15065,7 @@
                 </a:srgbClr>
               </a:gs>
               <a:gs pos="100000">
-                <a:srgbClr val="FABF53">
+                <a:srgbClr val="A6AAA9">
                   <a:alpha val="32629"/>
                 </a:srgbClr>
               </a:gs>
@@ -15211,7 +15098,7 @@
       </p:sp>
       <p:sp>
         <p:nvSpPr>
-          <p:cNvPr id="235" name="Group"/>
+          <p:cNvPr id="236" name="Rectangle"/>
           <p:cNvSpPr/>
           <p:nvPr/>
         </p:nvSpPr>
@@ -15224,7 +15111,7 @@
             <a:avLst/>
           </a:prstGeom>
           <a:solidFill>
-            <a:srgbClr val="79B0DC">
+            <a:srgbClr val="A6AAA9">
               <a:alpha val="23776"/>
             </a:srgbClr>
           </a:solidFill>
@@ -15254,7 +15141,7 @@
       </p:sp>
       <p:sp>
         <p:nvSpPr>
-          <p:cNvPr id="236" name="Group"/>
+          <p:cNvPr id="237" name="Rectangle"/>
           <p:cNvSpPr/>
           <p:nvPr/>
         </p:nvSpPr>
@@ -15267,7 +15154,7 @@
             <a:avLst/>
           </a:prstGeom>
           <a:solidFill>
-            <a:srgbClr val="79B0DC">
+            <a:srgbClr val="A6AAA9">
               <a:alpha val="23776"/>
             </a:srgbClr>
           </a:solidFill>
@@ -15297,7 +15184,7 @@
       </p:sp>
       <p:sp>
         <p:nvSpPr>
-          <p:cNvPr id="237" name="Group"/>
+          <p:cNvPr id="238" name="Rectangle"/>
           <p:cNvSpPr/>
           <p:nvPr/>
         </p:nvSpPr>
@@ -15310,7 +15197,7 @@
             <a:avLst/>
           </a:prstGeom>
           <a:solidFill>
-            <a:srgbClr val="79B0DC">
+            <a:srgbClr val="A6AAA9">
               <a:alpha val="23776"/>
             </a:srgbClr>
           </a:solidFill>
@@ -15340,7 +15227,7 @@
       </p:sp>
       <p:sp>
         <p:nvSpPr>
-          <p:cNvPr id="238" name="Line"/>
+          <p:cNvPr id="239" name="Line"/>
           <p:cNvSpPr/>
           <p:nvPr/>
         </p:nvSpPr>
@@ -15381,7 +15268,7 @@
       </p:sp>
       <p:sp>
         <p:nvSpPr>
-          <p:cNvPr id="239" name=".Rd FORMATTING TAGS"/>
+          <p:cNvPr id="240" name=".Rd FORMATTING TAGS"/>
           <p:cNvSpPr txBox="1"/>
           <p:nvPr/>
         </p:nvSpPr>
@@ -15417,7 +15304,7 @@
       </p:sp>
       <p:sp>
         <p:nvSpPr>
-          <p:cNvPr id="240" name="Add Data ( data/)"/>
+          <p:cNvPr id="241" name="Add Data ( data/)"/>
           <p:cNvSpPr txBox="1"/>
           <p:nvPr/>
         </p:nvSpPr>
@@ -15453,7 +15340,7 @@
               </a:spcBef>
               <a:defRPr b="0" sz="2500">
                 <a:solidFill>
-                  <a:srgbClr val="628DB5"/>
+                  <a:srgbClr val="797979"/>
                 </a:solidFill>
               </a:defRPr>
             </a:pPr>
@@ -15477,7 +15364,7 @@
       </p:sp>
       <p:sp>
         <p:nvSpPr>
-          <p:cNvPr id="241" name="RStudio® is a trademark of RStudio, Inc.  •  CC BY SA RStudio •  info@rstudio.com  •  844-448-1212 • rstudio.com •  Learn more at http://r-pkgs.had.co.nz/  •  devtools 1.5.1  •  Updated: 2015-01"/>
+          <p:cNvPr id="242" name="RStudio® is a trademark of RStudio, Inc.  •  CC BY SA RStudio •  info@rstudio.com  •  844-448-1212 • rstudio.com •  Learn more at http://r-pkgs.had.co.nz/  •  devtools 1.5.1  •  Updated: 2015-01"/>
           <p:cNvSpPr txBox="1"/>
           <p:nvPr/>
         </p:nvSpPr>
@@ -15522,7 +15409,7 @@
             </a:r>
             <a:r>
               <a:rPr>
-                <a:hlinkClick r:id="rId2" invalidUrl="" action="" tgtFrame="" tooltip="" history="1" highlightClick="0" endSnd="0"/>
+                <a:hlinkClick r:id="rId3" invalidUrl="" action="" tgtFrame="" tooltip="" history="1" highlightClick="0" endSnd="0"/>
               </a:rPr>
               <a:t>CC BY SA</a:t>
             </a:r>
@@ -15531,7 +15418,7 @@
             </a:r>
             <a:r>
               <a:rPr>
-                <a:hlinkClick r:id="rId3" invalidUrl="" action="" tgtFrame="" tooltip="" history="1" highlightClick="0" endSnd="0"/>
+                <a:hlinkClick r:id="rId4" invalidUrl="" action="" tgtFrame="" tooltip="" history="1" highlightClick="0" endSnd="0"/>
               </a:rPr>
               <a:t>info@rstudio.com</a:t>
             </a:r>
@@ -15540,7 +15427,7 @@
             </a:r>
             <a:r>
               <a:rPr>
-                <a:hlinkClick r:id="rId4" invalidUrl="" action="" tgtFrame="" tooltip="" history="1" highlightClick="0" endSnd="0"/>
+                <a:hlinkClick r:id="rId5" invalidUrl="" action="" tgtFrame="" tooltip="" history="1" highlightClick="0" endSnd="0"/>
               </a:rPr>
               <a:t>rstudio.com</a:t>
             </a:r>
@@ -15559,14 +15446,14 @@
       </p:sp>
       <p:pic>
         <p:nvPicPr>
-          <p:cNvPr id="242" name="Image" descr="Image"/>
+          <p:cNvPr id="243" name="Image" descr="Image"/>
           <p:cNvPicPr>
             <a:picLocks noChangeAspect="1"/>
           </p:cNvPicPr>
           <p:nvPr/>
         </p:nvPicPr>
         <p:blipFill>
-          <a:blip r:embed="rId5">
+          <a:blip r:embed="rId6">
             <a:extLst/>
           </a:blip>
           <a:stretch>
@@ -15588,7 +15475,7 @@
       </p:pic>
       <p:sp>
         <p:nvSpPr>
-          <p:cNvPr id="243" name="Line"/>
+          <p:cNvPr id="244" name="Line"/>
           <p:cNvSpPr/>
           <p:nvPr/>
         </p:nvSpPr>
@@ -15629,7 +15516,7 @@
       </p:sp>
       <p:sp>
         <p:nvSpPr>
-          <p:cNvPr id="244" name="Document ( man/)"/>
+          <p:cNvPr id="245" name="Document ( man/)"/>
           <p:cNvSpPr txBox="1"/>
           <p:nvPr/>
         </p:nvSpPr>
@@ -15665,7 +15552,7 @@
               </a:spcBef>
               <a:defRPr b="0" sz="2500">
                 <a:solidFill>
-                  <a:srgbClr val="628DB5"/>
+                  <a:srgbClr val="797979"/>
                 </a:solidFill>
               </a:defRPr>
             </a:pPr>
@@ -15689,7 +15576,7 @@
       </p:sp>
       <p:sp>
         <p:nvSpPr>
-          <p:cNvPr id="245" name="Line"/>
+          <p:cNvPr id="246" name="Line"/>
           <p:cNvSpPr/>
           <p:nvPr/>
         </p:nvSpPr>
@@ -15730,7 +15617,7 @@
       </p:sp>
       <p:sp>
         <p:nvSpPr>
-          <p:cNvPr id="246" name="Line"/>
+          <p:cNvPr id="247" name="Line"/>
           <p:cNvSpPr/>
           <p:nvPr/>
         </p:nvSpPr>
@@ -15771,7 +15658,7 @@
       </p:sp>
       <p:sp>
         <p:nvSpPr>
-          <p:cNvPr id="247" name="Organize ( NAMESPACE)"/>
+          <p:cNvPr id="248" name="Organize ( NAMESPACE)"/>
           <p:cNvSpPr txBox="1"/>
           <p:nvPr/>
         </p:nvSpPr>
@@ -15807,7 +15694,7 @@
               </a:spcBef>
               <a:defRPr b="0" sz="2500">
                 <a:solidFill>
-                  <a:srgbClr val="628DB5"/>
+                  <a:srgbClr val="797979"/>
                 </a:solidFill>
               </a:defRPr>
             </a:pPr>
@@ -15831,7 +15718,7 @@
       </p:sp>
       <p:sp>
         <p:nvSpPr>
-          <p:cNvPr id="248" name="Teach ( vignettes/)"/>
+          <p:cNvPr id="249" name="Teach ( vignettes/)"/>
           <p:cNvSpPr txBox="1"/>
           <p:nvPr/>
         </p:nvSpPr>
@@ -15867,7 +15754,7 @@
               </a:spcBef>
               <a:defRPr b="0" sz="2500">
                 <a:solidFill>
-                  <a:srgbClr val="628DB5"/>
+                  <a:srgbClr val="797979"/>
                 </a:solidFill>
               </a:defRPr>
             </a:pPr>
@@ -15891,7 +15778,7 @@
       </p:sp>
       <p:sp>
         <p:nvSpPr>
-          <p:cNvPr id="249" name="Line"/>
+          <p:cNvPr id="250" name="Line"/>
           <p:cNvSpPr/>
           <p:nvPr/>
         </p:nvSpPr>
@@ -15932,7 +15819,7 @@
       </p:sp>
       <p:sp>
         <p:nvSpPr>
-          <p:cNvPr id="250" name="---…"/>
+          <p:cNvPr id="251" name="---…"/>
           <p:cNvSpPr/>
           <p:nvPr/>
         </p:nvSpPr>
@@ -16193,7 +16080,7 @@
       </p:sp>
       <p:sp>
         <p:nvSpPr>
-          <p:cNvPr id="251" name=" vignettes/ holds documents that teach your users how to solve real problems with your tools."/>
+          <p:cNvPr id="252" name=" vignettes/ holds documents that teach your users how to solve real problems with your tools."/>
           <p:cNvSpPr txBox="1"/>
           <p:nvPr/>
         </p:nvSpPr>
@@ -16250,7 +16137,7 @@
       </p:sp>
       <p:sp>
         <p:nvSpPr>
-          <p:cNvPr id="252" name="Create a  vignettes/  directory and a template vignette with…"/>
+          <p:cNvPr id="253" name="Create a  vignettes/  directory and a template vignette with…"/>
           <p:cNvSpPr txBox="1"/>
           <p:nvPr/>
         </p:nvSpPr>
@@ -16323,11 +16210,7 @@
             <a:r>
               <a:rPr>
                 <a:solidFill>
-                  <a:schemeClr val="accent1">
-                    <a:hueOff val="195744"/>
-                    <a:satOff val="-47052"/>
-                    <a:lumOff val="24890"/>
-                  </a:schemeClr>
+                  <a:srgbClr val="797979"/>
                 </a:solidFill>
               </a:rPr>
               <a:t>devtools::</a:t>
@@ -16393,11 +16276,7 @@
             <a:r>
               <a:rPr>
                 <a:solidFill>
-                  <a:schemeClr val="accent1">
-                    <a:hueOff val="195744"/>
-                    <a:satOff val="-47052"/>
-                    <a:lumOff val="24890"/>
-                  </a:schemeClr>
+                  <a:srgbClr val="797979"/>
                 </a:solidFill>
               </a:rPr>
               <a:t>(</a:t>
@@ -16405,24 +16284,16 @@
             <a:r>
               <a:rPr u="sng">
                 <a:solidFill>
-                  <a:schemeClr val="accent1">
-                    <a:hueOff val="195744"/>
-                    <a:satOff val="-47052"/>
-                    <a:lumOff val="24890"/>
-                  </a:schemeClr>
-                </a:solidFill>
-                <a:hlinkClick r:id="rId6" invalidUrl="" action="" tgtFrame="" tooltip="" history="1" highlightClick="0" endSnd="0"/>
+                  <a:srgbClr val="797979"/>
+                </a:solidFill>
+                <a:hlinkClick r:id="rId7" invalidUrl="" action="" tgtFrame="" tooltip="" history="1" highlightClick="0" endSnd="0"/>
               </a:rPr>
               <a:t>rmarkdown.rstudio.com</a:t>
             </a:r>
             <a:r>
               <a:rPr>
                 <a:solidFill>
-                  <a:schemeClr val="accent1">
-                    <a:hueOff val="195744"/>
-                    <a:satOff val="-47052"/>
-                    <a:lumOff val="24890"/>
-                  </a:schemeClr>
+                  <a:srgbClr val="797979"/>
                 </a:solidFill>
               </a:rPr>
               <a:t>)</a:t>
@@ -16432,7 +16303,7 @@
       </p:sp>
       <p:sp>
         <p:nvSpPr>
-          <p:cNvPr id="253" name=""/>
+          <p:cNvPr id="254" name=""/>
           <p:cNvSpPr txBox="1"/>
           <p:nvPr/>
         </p:nvSpPr>
@@ -16464,11 +16335,7 @@
               </a:spcBef>
               <a:defRPr b="0" sz="2400">
                 <a:solidFill>
-                  <a:schemeClr val="accent1">
-                    <a:hueOff val="195744"/>
-                    <a:satOff val="-47052"/>
-                    <a:lumOff val="24890"/>
-                  </a:schemeClr>
+                  <a:srgbClr val="797979"/>
                 </a:solidFill>
                 <a:latin typeface="FontAwesome"/>
                 <a:ea typeface="FontAwesome"/>
@@ -16487,7 +16354,7 @@
       </p:sp>
       <p:sp>
         <p:nvSpPr>
-          <p:cNvPr id="254" name=""/>
+          <p:cNvPr id="255" name=""/>
           <p:cNvSpPr txBox="1"/>
           <p:nvPr/>
         </p:nvSpPr>
@@ -16519,11 +16386,7 @@
               </a:spcBef>
               <a:defRPr b="0" sz="2400">
                 <a:solidFill>
-                  <a:schemeClr val="accent1">
-                    <a:hueOff val="195744"/>
-                    <a:satOff val="-47052"/>
-                    <a:lumOff val="24890"/>
-                  </a:schemeClr>
+                  <a:srgbClr val="797979"/>
                 </a:solidFill>
                 <a:latin typeface="FontAwesome"/>
                 <a:ea typeface="FontAwesome"/>
@@ -16542,7 +16405,7 @@
       </p:sp>
       <p:sp>
         <p:nvSpPr>
-          <p:cNvPr id="255" name=""/>
+          <p:cNvPr id="256" name=""/>
           <p:cNvSpPr txBox="1"/>
           <p:nvPr/>
         </p:nvSpPr>
@@ -16574,11 +16437,7 @@
               </a:spcBef>
               <a:defRPr b="0" sz="2400">
                 <a:solidFill>
-                  <a:schemeClr val="accent1">
-                    <a:hueOff val="195744"/>
-                    <a:satOff val="-47052"/>
-                    <a:lumOff val="24890"/>
-                  </a:schemeClr>
+                  <a:srgbClr val="797979"/>
                 </a:solidFill>
                 <a:latin typeface="FontAwesome"/>
                 <a:ea typeface="FontAwesome"/>
@@ -16597,7 +16456,7 @@
       </p:sp>
       <p:sp>
         <p:nvSpPr>
-          <p:cNvPr id="256" name="\email{name@@foo.com}…"/>
+          <p:cNvPr id="257" name="\email{name@@foo.com}…"/>
           <p:cNvSpPr txBox="1"/>
           <p:nvPr/>
         </p:nvSpPr>
@@ -16640,11 +16499,7 @@
             <a:r>
               <a:rPr>
                 <a:solidFill>
-                  <a:schemeClr val="accent1">
-                    <a:hueOff val="195744"/>
-                    <a:satOff val="-47052"/>
-                    <a:lumOff val="24890"/>
-                  </a:schemeClr>
+                  <a:srgbClr val="797979"/>
                 </a:solidFill>
                 <a:latin typeface="Source Sans Pro Semibold"/>
                 <a:ea typeface="Source Sans Pro Semibold"/>
@@ -16674,11 +16529,7 @@
             <a:r>
               <a:rPr>
                 <a:solidFill>
-                  <a:schemeClr val="accent1">
-                    <a:hueOff val="195744"/>
-                    <a:satOff val="-47052"/>
-                    <a:lumOff val="24890"/>
-                  </a:schemeClr>
+                  <a:srgbClr val="797979"/>
                 </a:solidFill>
                 <a:latin typeface="Source Sans Pro Semibold"/>
                 <a:ea typeface="Source Sans Pro Semibold"/>
@@ -16693,11 +16544,7 @@
             <a:r>
               <a:rPr>
                 <a:solidFill>
-                  <a:schemeClr val="accent1">
-                    <a:hueOff val="195744"/>
-                    <a:satOff val="-47052"/>
-                    <a:lumOff val="24890"/>
-                  </a:schemeClr>
+                  <a:srgbClr val="797979"/>
                 </a:solidFill>
                 <a:latin typeface="Source Sans Pro Semibold"/>
                 <a:ea typeface="Source Sans Pro Semibold"/>
@@ -16727,11 +16574,7 @@
             <a:r>
               <a:rPr>
                 <a:solidFill>
-                  <a:schemeClr val="accent1">
-                    <a:hueOff val="195744"/>
-                    <a:satOff val="-47052"/>
-                    <a:lumOff val="24890"/>
-                  </a:schemeClr>
+                  <a:srgbClr val="797979"/>
                 </a:solidFill>
                 <a:latin typeface="Source Sans Pro Semibold"/>
                 <a:ea typeface="Source Sans Pro Semibold"/>
@@ -16773,11 +16616,7 @@
             <a:r>
               <a:rPr>
                 <a:solidFill>
-                  <a:schemeClr val="accent1">
-                    <a:hueOff val="195744"/>
-                    <a:satOff val="-47052"/>
-                    <a:lumOff val="24890"/>
-                  </a:schemeClr>
+                  <a:srgbClr val="797979"/>
                 </a:solidFill>
                 <a:latin typeface="Source Sans Pro Semibold"/>
                 <a:ea typeface="Source Sans Pro Semibold"/>
@@ -16792,11 +16631,7 @@
             <a:r>
               <a:rPr>
                 <a:solidFill>
-                  <a:schemeClr val="accent1">
-                    <a:hueOff val="195744"/>
-                    <a:satOff val="-47052"/>
-                    <a:lumOff val="24890"/>
-                  </a:schemeClr>
+                  <a:srgbClr val="797979"/>
                 </a:solidFill>
                 <a:latin typeface="Source Sans Pro Semibold"/>
                 <a:ea typeface="Source Sans Pro Semibold"/>
@@ -16826,11 +16661,7 @@
             <a:r>
               <a:rPr>
                 <a:solidFill>
-                  <a:schemeClr val="accent1">
-                    <a:hueOff val="195744"/>
-                    <a:satOff val="-47052"/>
-                    <a:lumOff val="24890"/>
-                  </a:schemeClr>
+                  <a:srgbClr val="797979"/>
                 </a:solidFill>
                 <a:latin typeface="Source Sans Pro Semibold"/>
                 <a:ea typeface="Source Sans Pro Semibold"/>
@@ -16860,11 +16691,7 @@
             <a:r>
               <a:rPr>
                 <a:solidFill>
-                  <a:schemeClr val="accent1">
-                    <a:hueOff val="195744"/>
-                    <a:satOff val="-47052"/>
-                    <a:lumOff val="24890"/>
-                  </a:schemeClr>
+                  <a:srgbClr val="797979"/>
                 </a:solidFill>
                 <a:latin typeface="Source Sans Pro Semibold"/>
                 <a:ea typeface="Source Sans Pro Semibold"/>
@@ -16894,11 +16721,7 @@
             <a:r>
               <a:rPr>
                 <a:solidFill>
-                  <a:schemeClr val="accent1">
-                    <a:hueOff val="195744"/>
-                    <a:satOff val="-47052"/>
-                    <a:lumOff val="24890"/>
-                  </a:schemeClr>
+                  <a:srgbClr val="797979"/>
                 </a:solidFill>
                 <a:latin typeface="Source Sans Pro Semibold"/>
                 <a:ea typeface="Source Sans Pro Semibold"/>
@@ -16913,11 +16736,7 @@
             <a:r>
               <a:rPr>
                 <a:solidFill>
-                  <a:schemeClr val="accent1">
-                    <a:hueOff val="195744"/>
-                    <a:satOff val="-47052"/>
-                    <a:lumOff val="24890"/>
-                  </a:schemeClr>
+                  <a:srgbClr val="797979"/>
                 </a:solidFill>
                 <a:latin typeface="Source Sans Pro Semibold"/>
                 <a:ea typeface="Source Sans Pro Semibold"/>
@@ -16959,11 +16778,7 @@
             <a:r>
               <a:rPr>
                 <a:solidFill>
-                  <a:schemeClr val="accent1">
-                    <a:hueOff val="195744"/>
-                    <a:satOff val="-47052"/>
-                    <a:lumOff val="24890"/>
-                  </a:schemeClr>
+                  <a:srgbClr val="797979"/>
                 </a:solidFill>
                 <a:latin typeface="Source Sans Pro Semibold"/>
                 <a:ea typeface="Source Sans Pro Semibold"/>
@@ -16988,16 +16803,20 @@
               </a:defRPr>
             </a:pPr>
             <a:r>
-              <a:t>    </a:t>
+              <a:t>   </a:t>
             </a:r>
             <a:r>
               <a:rPr>
                 <a:solidFill>
-                  <a:schemeClr val="accent1">
-                    <a:hueOff val="195744"/>
-                    <a:satOff val="-47052"/>
-                    <a:lumOff val="24890"/>
-                  </a:schemeClr>
+                  <a:srgbClr val="797979"/>
+                </a:solidFill>
+              </a:rPr>
+              <a:t> </a:t>
+            </a:r>
+            <a:r>
+              <a:rPr>
+                <a:solidFill>
+                  <a:srgbClr val="797979"/>
                 </a:solidFill>
                 <a:latin typeface="Source Sans Pro Semibold"/>
                 <a:ea typeface="Source Sans Pro Semibold"/>
@@ -17020,11 +16839,7 @@
             <a:r>
               <a:rPr>
                 <a:solidFill>
-                  <a:schemeClr val="accent1">
-                    <a:hueOff val="195744"/>
-                    <a:satOff val="-47052"/>
-                    <a:lumOff val="24890"/>
-                  </a:schemeClr>
+                  <a:srgbClr val="797979"/>
                 </a:solidFill>
                 <a:latin typeface="Source Sans Pro Semibold"/>
                 <a:ea typeface="Source Sans Pro Semibold"/>
@@ -17055,11 +16870,7 @@
             <a:r>
               <a:rPr>
                 <a:solidFill>
-                  <a:schemeClr val="accent1">
-                    <a:hueOff val="195744"/>
-                    <a:satOff val="-47052"/>
-                    <a:lumOff val="24890"/>
-                  </a:schemeClr>
+                  <a:srgbClr val="797979"/>
                 </a:solidFill>
                 <a:latin typeface="Source Sans Pro Semibold"/>
                 <a:ea typeface="Source Sans Pro Semibold"/>
@@ -17107,30 +16918,7 @@
             <a:r>
               <a:rPr>
                 <a:solidFill>
-                  <a:schemeClr val="accent1">
-                    <a:hueOff val="195744"/>
-                    <a:satOff val="-47052"/>
-                    <a:lumOff val="24890"/>
-                  </a:schemeClr>
-                </a:solidFill>
-                <a:latin typeface="Source Sans Pro Semibold"/>
-                <a:ea typeface="Source Sans Pro Semibold"/>
-                <a:cs typeface="Source Sans Pro Semibold"/>
-                <a:sym typeface="Source Sans Pro Semibold"/>
-              </a:rPr>
-              <a:t>cell </a:t>
-            </a:r>
-            <a:r>
-              <a:t>\tab </a:t>
-            </a:r>
-            <a:r>
-              <a:rPr>
-                <a:solidFill>
-                  <a:schemeClr val="accent1">
-                    <a:hueOff val="195744"/>
-                    <a:satOff val="-47052"/>
-                    <a:lumOff val="24890"/>
-                  </a:schemeClr>
+                  <a:srgbClr val="797979"/>
                 </a:solidFill>
                 <a:latin typeface="Source Sans Pro Semibold"/>
                 <a:ea typeface="Source Sans Pro Semibold"/>
@@ -17142,25 +16930,6 @@
             <a:r>
               <a:rPr>
                 <a:solidFill>
-                  <a:schemeClr val="accent1"/>
-                </a:solidFill>
-              </a:rPr>
-              <a:t>            </a:t>
-            </a:r>
-            <a:r>
-              <a:t>\tab</a:t>
-            </a:r>
-            <a:r>
-              <a:rPr>
-                <a:solidFill>
-                  <a:schemeClr val="accent1"/>
-                </a:solidFill>
-              </a:rPr>
-              <a:t> </a:t>
-            </a:r>
-            <a:r>
-              <a:rPr>
-                <a:solidFill>
                   <a:schemeClr val="accent1">
                     <a:hueOff val="195744"/>
                     <a:satOff val="-47052"/>
@@ -17172,7 +16941,77 @@
                 <a:cs typeface="Source Sans Pro Semibold"/>
                 <a:sym typeface="Source Sans Pro Semibold"/>
               </a:rPr>
-              <a:t>cell </a:t>
+              <a:t> </a:t>
+            </a:r>
+            <a:r>
+              <a:t>\tab </a:t>
+            </a:r>
+            <a:r>
+              <a:rPr>
+                <a:solidFill>
+                  <a:srgbClr val="797979"/>
+                </a:solidFill>
+                <a:latin typeface="Source Sans Pro Semibold"/>
+                <a:ea typeface="Source Sans Pro Semibold"/>
+                <a:cs typeface="Source Sans Pro Semibold"/>
+                <a:sym typeface="Source Sans Pro Semibold"/>
+              </a:rPr>
+              <a:t>cell</a:t>
+            </a:r>
+            <a:r>
+              <a:rPr>
+                <a:solidFill>
+                  <a:srgbClr val="797979"/>
+                </a:solidFill>
+              </a:rPr>
+              <a:t> </a:t>
+            </a:r>
+            <a:r>
+              <a:rPr>
+                <a:solidFill>
+                  <a:schemeClr val="accent1"/>
+                </a:solidFill>
+              </a:rPr>
+              <a:t>           </a:t>
+            </a:r>
+            <a:r>
+              <a:t>\tab</a:t>
+            </a:r>
+            <a:r>
+              <a:rPr>
+                <a:solidFill>
+                  <a:schemeClr val="accent1"/>
+                </a:solidFill>
+              </a:rPr>
+              <a:t> </a:t>
+            </a:r>
+            <a:r>
+              <a:rPr>
+                <a:solidFill>
+                  <a:srgbClr val="797979"/>
+                </a:solidFill>
+                <a:latin typeface="Source Sans Pro Semibold"/>
+                <a:ea typeface="Source Sans Pro Semibold"/>
+                <a:cs typeface="Source Sans Pro Semibold"/>
+                <a:sym typeface="Source Sans Pro Semibold"/>
+              </a:rPr>
+              <a:t>cell</a:t>
+            </a:r>
+            <a:r>
+              <a:rPr>
+                <a:solidFill>
+                  <a:schemeClr val="accent1">
+                    <a:hueOff val="195744"/>
+                    <a:satOff val="-47052"/>
+                    <a:lumOff val="24890"/>
+                  </a:schemeClr>
+                </a:solidFill>
+                <a:latin typeface="Source Sans Pro Semibold"/>
+                <a:ea typeface="Source Sans Pro Semibold"/>
+                <a:cs typeface="Source Sans Pro Semibold"/>
+                <a:sym typeface="Source Sans Pro Semibold"/>
+              </a:rPr>
+              <a:t> </a:t>
             </a:r>
             <a:r>
               <a:rPr>
@@ -17205,7 +17044,7 @@
       </p:sp>
       <p:sp>
         <p:nvSpPr>
-          <p:cNvPr id="257" name="\emph{italic text}…"/>
+          <p:cNvPr id="258" name="\emph{italic text}…"/>
           <p:cNvSpPr txBox="1"/>
           <p:nvPr/>
         </p:nvSpPr>
@@ -17248,11 +17087,7 @@
             <a:r>
               <a:rPr>
                 <a:solidFill>
-                  <a:schemeClr val="accent1">
-                    <a:hueOff val="195744"/>
-                    <a:satOff val="-47052"/>
-                    <a:lumOff val="24890"/>
-                  </a:schemeClr>
+                  <a:srgbClr val="797979"/>
                 </a:solidFill>
                 <a:latin typeface="Source Sans Pro Semibold"/>
                 <a:ea typeface="Source Sans Pro Semibold"/>
@@ -17282,11 +17117,7 @@
             <a:r>
               <a:rPr>
                 <a:solidFill>
-                  <a:schemeClr val="accent1">
-                    <a:hueOff val="195744"/>
-                    <a:satOff val="-47052"/>
-                    <a:lumOff val="24890"/>
-                  </a:schemeClr>
+                  <a:srgbClr val="797979"/>
                 </a:solidFill>
                 <a:latin typeface="Source Sans Pro Semibold"/>
                 <a:ea typeface="Source Sans Pro Semibold"/>
@@ -17316,11 +17147,7 @@
             <a:r>
               <a:rPr>
                 <a:solidFill>
-                  <a:schemeClr val="accent1">
-                    <a:hueOff val="195744"/>
-                    <a:satOff val="-47052"/>
-                    <a:lumOff val="24890"/>
-                  </a:schemeClr>
+                  <a:srgbClr val="797979"/>
                 </a:solidFill>
                 <a:latin typeface="Source Sans Pro Semibold"/>
                 <a:ea typeface="Source Sans Pro Semibold"/>
@@ -17350,11 +17177,7 @@
             <a:r>
               <a:rPr>
                 <a:solidFill>
-                  <a:schemeClr val="accent1">
-                    <a:hueOff val="195744"/>
-                    <a:satOff val="-47052"/>
-                    <a:lumOff val="24890"/>
-                  </a:schemeClr>
+                  <a:srgbClr val="797979"/>
                 </a:solidFill>
                 <a:latin typeface="Source Sans Pro Semibold"/>
                 <a:ea typeface="Source Sans Pro Semibold"/>
@@ -17396,11 +17219,7 @@
             <a:r>
               <a:rPr>
                 <a:solidFill>
-                  <a:schemeClr val="accent1">
-                    <a:hueOff val="195744"/>
-                    <a:satOff val="-47052"/>
-                    <a:lumOff val="24890"/>
-                  </a:schemeClr>
+                  <a:srgbClr val="797979"/>
                 </a:solidFill>
                 <a:latin typeface="Source Sans Pro Semibold"/>
                 <a:ea typeface="Source Sans Pro Semibold"/>
@@ -17430,11 +17249,7 @@
             <a:r>
               <a:rPr>
                 <a:solidFill>
-                  <a:schemeClr val="accent1">
-                    <a:hueOff val="195744"/>
-                    <a:satOff val="-47052"/>
-                    <a:lumOff val="24890"/>
-                  </a:schemeClr>
+                  <a:srgbClr val="797979"/>
                 </a:solidFill>
                 <a:latin typeface="Source Sans Pro Semibold"/>
                 <a:ea typeface="Source Sans Pro Semibold"/>
@@ -17464,11 +17279,7 @@
             <a:r>
               <a:rPr>
                 <a:solidFill>
-                  <a:schemeClr val="accent1">
-                    <a:hueOff val="195744"/>
-                    <a:satOff val="-47052"/>
-                    <a:lumOff val="24890"/>
-                  </a:schemeClr>
+                  <a:srgbClr val="797979"/>
                 </a:solidFill>
                 <a:latin typeface="Source Sans Pro Semibold"/>
                 <a:ea typeface="Source Sans Pro Semibold"/>
@@ -17510,11 +17321,7 @@
             <a:r>
               <a:rPr>
                 <a:solidFill>
-                  <a:schemeClr val="accent1">
-                    <a:hueOff val="195744"/>
-                    <a:satOff val="-47052"/>
-                    <a:lumOff val="24890"/>
-                  </a:schemeClr>
+                  <a:srgbClr val="797979"/>
                 </a:solidFill>
                 <a:latin typeface="Source Sans Pro Semibold"/>
                 <a:ea typeface="Source Sans Pro Semibold"/>
@@ -17544,11 +17351,7 @@
             <a:r>
               <a:rPr>
                 <a:solidFill>
-                  <a:schemeClr val="accent1">
-                    <a:hueOff val="195744"/>
-                    <a:satOff val="-47052"/>
-                    <a:lumOff val="24890"/>
-                  </a:schemeClr>
+                  <a:srgbClr val="797979"/>
                 </a:solidFill>
                 <a:latin typeface="Source Sans Pro Semibold"/>
                 <a:ea typeface="Source Sans Pro Semibold"/>
@@ -17565,7 +17368,7 @@
       </p:sp>
       <p:sp>
         <p:nvSpPr>
-          <p:cNvPr id="258" name=" man/ contains the documentation for your functions, the help…"/>
+          <p:cNvPr id="259" name=" man/ contains the documentation for your functions, the help…"/>
           <p:cNvSpPr txBox="1"/>
           <p:nvPr/>
         </p:nvSpPr>
@@ -17640,7 +17443,7 @@
       </p:sp>
       <p:sp>
         <p:nvSpPr>
-          <p:cNvPr id="259" name="1. Add roxygen comments in your .R files…"/>
+          <p:cNvPr id="260" name="1. Add roxygen comments in your .R files…"/>
           <p:cNvSpPr txBox="1"/>
           <p:nvPr/>
         </p:nvSpPr>
@@ -17745,11 +17548,7 @@
             <a:r>
               <a:rPr>
                 <a:solidFill>
-                  <a:schemeClr val="accent1">
-                    <a:hueOff val="195744"/>
-                    <a:satOff val="-47052"/>
-                    <a:lumOff val="24890"/>
-                  </a:schemeClr>
+                  <a:srgbClr val="797979"/>
                 </a:solidFill>
               </a:rPr>
               <a:t>devtools::</a:t>
@@ -17835,11 +17634,7 @@
             <a:r>
               <a:rPr>
                 <a:solidFill>
-                  <a:schemeClr val="accent1">
-                    <a:hueOff val="195744"/>
-                    <a:satOff val="-47052"/>
-                    <a:lumOff val="24890"/>
-                  </a:schemeClr>
+                  <a:srgbClr val="797979"/>
                 </a:solidFill>
               </a:rPr>
               <a:t>(Keyboard Shortcut)</a:t>
@@ -17910,7 +17705,7 @@
       </p:sp>
       <p:sp>
         <p:nvSpPr>
-          <p:cNvPr id="260" name="Use roxygen comments to document each function beside its definition…"/>
+          <p:cNvPr id="261" name="Use roxygen comments to document each function beside its definition…"/>
           <p:cNvSpPr txBox="1"/>
           <p:nvPr/>
         </p:nvSpPr>
@@ -17994,7 +17789,7 @@
       </p:sp>
       <p:sp>
         <p:nvSpPr>
-          <p:cNvPr id="261" name=""/>
+          <p:cNvPr id="262" name=""/>
           <p:cNvSpPr txBox="1"/>
           <p:nvPr/>
         </p:nvSpPr>
@@ -18026,11 +17821,7 @@
               </a:spcBef>
               <a:defRPr b="0" sz="2400">
                 <a:solidFill>
-                  <a:schemeClr val="accent1">
-                    <a:hueOff val="195744"/>
-                    <a:satOff val="-47052"/>
-                    <a:lumOff val="24890"/>
-                  </a:schemeClr>
+                  <a:srgbClr val="797979"/>
                 </a:solidFill>
                 <a:latin typeface="FontAwesome"/>
                 <a:ea typeface="FontAwesome"/>
@@ -18049,7 +17840,7 @@
       </p:sp>
       <p:sp>
         <p:nvSpPr>
-          <p:cNvPr id="262" name=""/>
+          <p:cNvPr id="263" name=""/>
           <p:cNvSpPr txBox="1"/>
           <p:nvPr/>
         </p:nvSpPr>
@@ -18081,11 +17872,7 @@
               </a:spcBef>
               <a:defRPr b="0" sz="2400">
                 <a:solidFill>
-                  <a:schemeClr val="accent1">
-                    <a:hueOff val="195744"/>
-                    <a:satOff val="-47052"/>
-                    <a:lumOff val="24890"/>
-                  </a:schemeClr>
+                  <a:srgbClr val="797979"/>
                 </a:solidFill>
                 <a:latin typeface="FontAwesome"/>
                 <a:ea typeface="FontAwesome"/>
@@ -18104,7 +17891,7 @@
       </p:sp>
       <p:sp>
         <p:nvSpPr>
-          <p:cNvPr id="263" name=""/>
+          <p:cNvPr id="264" name=""/>
           <p:cNvSpPr txBox="1"/>
           <p:nvPr/>
         </p:nvSpPr>
@@ -18136,11 +17923,7 @@
               </a:spcBef>
               <a:defRPr b="0" sz="2400">
                 <a:solidFill>
-                  <a:schemeClr val="accent1">
-                    <a:hueOff val="195744"/>
-                    <a:satOff val="-47052"/>
-                    <a:lumOff val="24890"/>
-                  </a:schemeClr>
+                  <a:srgbClr val="797979"/>
                 </a:solidFill>
                 <a:latin typeface="FontAwesome"/>
                 <a:ea typeface="FontAwesome"/>
@@ -18159,7 +17942,7 @@
       </p:sp>
       <p:sp>
         <p:nvSpPr>
-          <p:cNvPr id="264" name="Line"/>
+          <p:cNvPr id="265" name="Line"/>
           <p:cNvSpPr/>
           <p:nvPr/>
         </p:nvSpPr>
@@ -18202,7 +17985,7 @@
       </p:sp>
       <p:sp>
         <p:nvSpPr>
-          <p:cNvPr id="265" name="WORKFLOW"/>
+          <p:cNvPr id="266" name="WORKFLOW"/>
           <p:cNvSpPr txBox="1"/>
           <p:nvPr/>
         </p:nvSpPr>
@@ -18238,7 +18021,7 @@
       </p:sp>
       <p:sp>
         <p:nvSpPr>
-          <p:cNvPr id="266" name="Line"/>
+          <p:cNvPr id="267" name="Line"/>
           <p:cNvSpPr/>
           <p:nvPr/>
         </p:nvSpPr>
@@ -18281,7 +18064,7 @@
       </p:sp>
       <p:sp>
         <p:nvSpPr>
-          <p:cNvPr id="267" name="The roxygen2 package lets you write…"/>
+          <p:cNvPr id="268" name="The roxygen2 package lets you write…"/>
           <p:cNvSpPr txBox="1"/>
           <p:nvPr/>
         </p:nvSpPr>
@@ -18516,7 +18299,7 @@
       </p:sp>
       <p:sp>
         <p:nvSpPr>
-          <p:cNvPr id="268" name="#' Add together two numbers.…"/>
+          <p:cNvPr id="269" name="#' Add together two numbers.…"/>
           <p:cNvSpPr/>
           <p:nvPr/>
         </p:nvSpPr>
@@ -18563,7 +18346,7 @@
               </a:spcBef>
               <a:defRPr b="0" sz="950">
                 <a:solidFill>
-                  <a:schemeClr val="accent1"/>
+                  <a:srgbClr val="797979"/>
                 </a:solidFill>
                 <a:latin typeface="Menlo"/>
                 <a:ea typeface="Menlo"/>
@@ -18585,7 +18368,7 @@
               </a:spcBef>
               <a:defRPr b="0" sz="950">
                 <a:solidFill>
-                  <a:schemeClr val="accent1"/>
+                  <a:srgbClr val="797979"/>
                 </a:solidFill>
                 <a:latin typeface="Menlo"/>
                 <a:ea typeface="Menlo"/>
@@ -18607,7 +18390,7 @@
               </a:spcBef>
               <a:defRPr b="0" sz="950">
                 <a:solidFill>
-                  <a:schemeClr val="accent1"/>
+                  <a:srgbClr val="797979"/>
                 </a:solidFill>
                 <a:latin typeface="Menlo"/>
                 <a:ea typeface="Menlo"/>
@@ -18629,7 +18412,7 @@
               </a:spcBef>
               <a:defRPr b="0" sz="950">
                 <a:solidFill>
-                  <a:schemeClr val="accent1"/>
+                  <a:srgbClr val="797979"/>
                 </a:solidFill>
                 <a:latin typeface="Menlo"/>
                 <a:ea typeface="Menlo"/>
@@ -18651,7 +18434,7 @@
               </a:spcBef>
               <a:defRPr b="0" sz="950">
                 <a:solidFill>
-                  <a:schemeClr val="accent1"/>
+                  <a:srgbClr val="797979"/>
                 </a:solidFill>
                 <a:latin typeface="Menlo"/>
                 <a:ea typeface="Menlo"/>
@@ -18673,7 +18456,7 @@
               </a:spcBef>
               <a:defRPr b="0" sz="950">
                 <a:solidFill>
-                  <a:schemeClr val="accent1"/>
+                  <a:srgbClr val="797979"/>
                 </a:solidFill>
                 <a:latin typeface="Menlo"/>
                 <a:ea typeface="Menlo"/>
@@ -18695,7 +18478,7 @@
               </a:spcBef>
               <a:defRPr b="0" sz="950">
                 <a:solidFill>
-                  <a:schemeClr val="accent1"/>
+                  <a:srgbClr val="797979"/>
                 </a:solidFill>
                 <a:latin typeface="Menlo"/>
                 <a:ea typeface="Menlo"/>
@@ -18717,7 +18500,7 @@
               </a:spcBef>
               <a:defRPr b="0" sz="950">
                 <a:solidFill>
-                  <a:schemeClr val="accent1"/>
+                  <a:srgbClr val="797979"/>
                 </a:solidFill>
                 <a:latin typeface="Menlo"/>
                 <a:ea typeface="Menlo"/>
@@ -18799,7 +18582,7 @@
       </p:sp>
       <p:sp>
         <p:nvSpPr>
-          <p:cNvPr id="269" name="Rectangle"/>
+          <p:cNvPr id="270" name="Rectangle"/>
           <p:cNvSpPr/>
           <p:nvPr/>
         </p:nvSpPr>
@@ -18842,7 +18625,7 @@
       </p:sp>
       <p:sp>
         <p:nvSpPr>
-          <p:cNvPr id="270" name="Rectangle"/>
+          <p:cNvPr id="271" name="Rectangle"/>
           <p:cNvSpPr/>
           <p:nvPr/>
         </p:nvSpPr>
@@ -18885,7 +18668,7 @@
       </p:sp>
       <p:sp>
         <p:nvSpPr>
-          <p:cNvPr id="271" name="Rectangle"/>
+          <p:cNvPr id="272" name="Rectangle"/>
           <p:cNvSpPr/>
           <p:nvPr/>
         </p:nvSpPr>
@@ -18928,7 +18711,7 @@
       </p:sp>
       <p:sp>
         <p:nvSpPr>
-          <p:cNvPr id="272" name="data"/>
+          <p:cNvPr id="273" name="data"/>
           <p:cNvSpPr txBox="1"/>
           <p:nvPr/>
         </p:nvSpPr>
@@ -18961,11 +18744,7 @@
               </a:spcBef>
               <a:defRPr b="0">
                 <a:solidFill>
-                  <a:schemeClr val="accent1">
-                    <a:hueOff val="195744"/>
-                    <a:satOff val="-47052"/>
-                    <a:lumOff val="24890"/>
-                  </a:schemeClr>
+                  <a:srgbClr val="797979"/>
                 </a:solidFill>
               </a:defRPr>
             </a:pPr>
@@ -18977,7 +18756,7 @@
       </p:sp>
       <p:sp>
         <p:nvSpPr>
-          <p:cNvPr id="273" name="S4"/>
+          <p:cNvPr id="274" name="S4"/>
           <p:cNvSpPr txBox="1"/>
           <p:nvPr/>
         </p:nvSpPr>
@@ -19010,11 +18789,7 @@
               </a:spcBef>
               <a:defRPr b="0">
                 <a:solidFill>
-                  <a:schemeClr val="accent1">
-                    <a:hueOff val="195744"/>
-                    <a:satOff val="-47052"/>
-                    <a:lumOff val="24890"/>
-                  </a:schemeClr>
+                  <a:srgbClr val="797979"/>
                 </a:solidFill>
               </a:defRPr>
             </a:pPr>
@@ -19026,7 +18801,7 @@
       </p:sp>
       <p:sp>
         <p:nvSpPr>
-          <p:cNvPr id="274" name="RC"/>
+          <p:cNvPr id="275" name="RC"/>
           <p:cNvSpPr txBox="1"/>
           <p:nvPr/>
         </p:nvSpPr>
@@ -19059,11 +18834,7 @@
               </a:spcBef>
               <a:defRPr b="0">
                 <a:solidFill>
-                  <a:schemeClr val="accent1">
-                    <a:hueOff val="195744"/>
-                    <a:satOff val="-47052"/>
-                    <a:lumOff val="24890"/>
-                  </a:schemeClr>
+                  <a:srgbClr val="797979"/>
                 </a:solidFill>
               </a:defRPr>
             </a:pPr>
@@ -19075,7 +18846,7 @@
       </p:sp>
       <p:sp>
         <p:nvSpPr>
-          <p:cNvPr id="275" name="@aliases…"/>
+          <p:cNvPr id="276" name="@aliases…"/>
           <p:cNvSpPr txBox="1"/>
           <p:nvPr/>
         </p:nvSpPr>
@@ -19213,7 +18984,7 @@
       </p:sp>
       <p:sp>
         <p:nvSpPr>
-          <p:cNvPr id="276" name="@inheritParams…"/>
+          <p:cNvPr id="277" name="@inheritParams…"/>
           <p:cNvSpPr txBox="1"/>
           <p:nvPr/>
         </p:nvSpPr>
@@ -19355,7 +19126,7 @@
       </p:sp>
       <p:sp>
         <p:nvSpPr>
-          <p:cNvPr id="277" name="@seealso…"/>
+          <p:cNvPr id="278" name="@seealso…"/>
           <p:cNvSpPr txBox="1"/>
           <p:nvPr/>
         </p:nvSpPr>
@@ -19493,7 +19264,7 @@
       </p:sp>
       <p:sp>
         <p:nvSpPr>
-          <p:cNvPr id="278" name="COMMON ROXYGEN TAGS"/>
+          <p:cNvPr id="279" name="COMMON ROXYGEN TAGS"/>
           <p:cNvSpPr txBox="1"/>
           <p:nvPr/>
         </p:nvSpPr>
@@ -19529,7 +19300,7 @@
       </p:sp>
       <p:sp>
         <p:nvSpPr>
-          <p:cNvPr id="279" name="Line"/>
+          <p:cNvPr id="280" name="Line"/>
           <p:cNvSpPr/>
           <p:nvPr/>
         </p:nvSpPr>
@@ -19572,7 +19343,7 @@
       </p:sp>
       <p:sp>
         <p:nvSpPr>
-          <p:cNvPr id="280" name="devtools::use_data()…"/>
+          <p:cNvPr id="281" name="devtools::use_data()…"/>
           <p:cNvSpPr txBox="1"/>
           <p:nvPr/>
         </p:nvSpPr>
@@ -19615,11 +19386,7 @@
             <a:r>
               <a:rPr>
                 <a:solidFill>
-                  <a:schemeClr val="accent1">
-                    <a:hueOff val="195744"/>
-                    <a:satOff val="-47052"/>
-                    <a:lumOff val="24890"/>
-                  </a:schemeClr>
+                  <a:srgbClr val="797979"/>
                 </a:solidFill>
               </a:rPr>
               <a:t>devtools::</a:t>
@@ -19709,11 +19476,7 @@
             <a:r>
               <a:rPr>
                 <a:solidFill>
-                  <a:schemeClr val="accent1">
-                    <a:hueOff val="195744"/>
-                    <a:satOff val="-47052"/>
-                    <a:lumOff val="24890"/>
-                  </a:schemeClr>
+                  <a:srgbClr val="797979"/>
                 </a:solidFill>
               </a:rPr>
               <a:t>devtools::</a:t>
@@ -19750,7 +19513,7 @@
       </p:sp>
       <p:sp>
         <p:nvSpPr>
-          <p:cNvPr id="281" name="Group"/>
+          <p:cNvPr id="282" name="Rectangle"/>
           <p:cNvSpPr/>
           <p:nvPr/>
         </p:nvSpPr>
@@ -19763,7 +19526,7 @@
             <a:avLst/>
           </a:prstGeom>
           <a:solidFill>
-            <a:srgbClr val="79B0DC">
+            <a:srgbClr val="A6AAA9">
               <a:alpha val="23776"/>
             </a:srgbClr>
           </a:solidFill>
@@ -19793,7 +19556,7 @@
       </p:sp>
       <p:sp>
         <p:nvSpPr>
-          <p:cNvPr id="282" name="Save data as .Rdata files (suggested)…"/>
+          <p:cNvPr id="283" name="Save data as .Rdata files (suggested)…"/>
           <p:cNvSpPr txBox="1"/>
           <p:nvPr/>
         </p:nvSpPr>
@@ -19902,7 +19665,7 @@
       </p:sp>
       <p:sp>
         <p:nvSpPr>
-          <p:cNvPr id="283" name=""/>
+          <p:cNvPr id="284" name=""/>
           <p:cNvSpPr txBox="1"/>
           <p:nvPr/>
         </p:nvSpPr>
@@ -19934,11 +19697,7 @@
               </a:spcBef>
               <a:defRPr b="0" sz="2400">
                 <a:solidFill>
-                  <a:schemeClr val="accent1">
-                    <a:hueOff val="195744"/>
-                    <a:satOff val="-47052"/>
-                    <a:lumOff val="24890"/>
-                  </a:schemeClr>
+                  <a:srgbClr val="797979"/>
                 </a:solidFill>
                 <a:latin typeface="FontAwesome"/>
                 <a:ea typeface="FontAwesome"/>
@@ -19957,7 +19716,7 @@
       </p:sp>
       <p:sp>
         <p:nvSpPr>
-          <p:cNvPr id="284" name=""/>
+          <p:cNvPr id="285" name=""/>
           <p:cNvSpPr txBox="1"/>
           <p:nvPr/>
         </p:nvSpPr>
@@ -19989,11 +19748,7 @@
               </a:spcBef>
               <a:defRPr b="0" sz="2400">
                 <a:solidFill>
-                  <a:schemeClr val="accent1">
-                    <a:hueOff val="195744"/>
-                    <a:satOff val="-47052"/>
-                    <a:lumOff val="24890"/>
-                  </a:schemeClr>
+                  <a:srgbClr val="797979"/>
                 </a:solidFill>
                 <a:latin typeface="FontAwesome"/>
                 <a:ea typeface="FontAwesome"/>
@@ -20012,7 +19767,7 @@
       </p:sp>
       <p:sp>
         <p:nvSpPr>
-          <p:cNvPr id="285" name=""/>
+          <p:cNvPr id="286" name=""/>
           <p:cNvSpPr txBox="1"/>
           <p:nvPr/>
         </p:nvSpPr>
@@ -20044,11 +19799,7 @@
               </a:spcBef>
               <a:defRPr b="0" sz="2400">
                 <a:solidFill>
-                  <a:schemeClr val="accent1">
-                    <a:hueOff val="195744"/>
-                    <a:satOff val="-47052"/>
-                    <a:lumOff val="24890"/>
-                  </a:schemeClr>
+                  <a:srgbClr val="797979"/>
                 </a:solidFill>
                 <a:latin typeface="FontAwesome"/>
                 <a:ea typeface="FontAwesome"/>
@@ -20067,7 +19818,7 @@
       </p:sp>
       <p:sp>
         <p:nvSpPr>
-          <p:cNvPr id="286" name="Store data in…"/>
+          <p:cNvPr id="287" name="Store data in…"/>
           <p:cNvSpPr txBox="1"/>
           <p:nvPr/>
         </p:nvSpPr>
@@ -20192,7 +19943,7 @@
       </p:sp>
       <p:sp>
         <p:nvSpPr>
-          <p:cNvPr id="287" name="The  data/ directory allows you to…"/>
+          <p:cNvPr id="288" name="The  data/ directory allows you to…"/>
           <p:cNvSpPr txBox="1"/>
           <p:nvPr/>
         </p:nvSpPr>
@@ -20270,7 +20021,7 @@
       </p:sp>
       <p:sp>
         <p:nvSpPr>
-          <p:cNvPr id="288" name="Line"/>
+          <p:cNvPr id="289" name="Line"/>
           <p:cNvSpPr/>
           <p:nvPr/>
         </p:nvSpPr>
@@ -20313,7 +20064,7 @@
       </p:sp>
       <p:sp>
         <p:nvSpPr>
-          <p:cNvPr id="289" name="The   NAMESPACE file helps you make your package self-contained: it won’t interfere with other packages, and other packages won’t interfere with it."/>
+          <p:cNvPr id="290" name="The   NAMESPACE file helps you make your package self-contained: it won’t interfere with other packages, and other packages won’t interfere with it."/>
           <p:cNvSpPr txBox="1"/>
           <p:nvPr/>
         </p:nvSpPr>
@@ -20376,7 +20127,7 @@
       </p:sp>
       <p:sp>
         <p:nvSpPr>
-          <p:cNvPr id="290" name="Export functions for users by placing @export in their roxygen comments…"/>
+          <p:cNvPr id="291" name="Export functions for users by placing @export in their roxygen comments…"/>
           <p:cNvSpPr txBox="1"/>
           <p:nvPr/>
         </p:nvSpPr>
@@ -20484,7 +20235,7 @@
       </p:sp>
       <p:sp>
         <p:nvSpPr>
-          <p:cNvPr id="291" name="1. Modify your code or tests.…"/>
+          <p:cNvPr id="292" name="1. Modify your code or tests.…"/>
           <p:cNvSpPr txBox="1"/>
           <p:nvPr/>
         </p:nvSpPr>
@@ -20566,11 +20317,7 @@
             <a:r>
               <a:rPr>
                 <a:solidFill>
-                  <a:schemeClr val="accent1">
-                    <a:hueOff val="195744"/>
-                    <a:satOff val="-47052"/>
-                    <a:lumOff val="24890"/>
-                  </a:schemeClr>
+                  <a:srgbClr val="797979"/>
                 </a:solidFill>
               </a:rPr>
               <a:t>devtools::</a:t>
@@ -20641,7 +20388,7 @@
       </p:sp>
       <p:sp>
         <p:nvSpPr>
-          <p:cNvPr id="292" name=""/>
+          <p:cNvPr id="293" name=""/>
           <p:cNvSpPr txBox="1"/>
           <p:nvPr/>
         </p:nvSpPr>
@@ -20673,11 +20420,7 @@
               </a:spcBef>
               <a:defRPr b="0" sz="2400">
                 <a:solidFill>
-                  <a:schemeClr val="accent1">
-                    <a:hueOff val="195744"/>
-                    <a:satOff val="-47052"/>
-                    <a:lumOff val="24890"/>
-                  </a:schemeClr>
+                  <a:srgbClr val="797979"/>
                 </a:solidFill>
                 <a:latin typeface="FontAwesome"/>
                 <a:ea typeface="FontAwesome"/>
@@ -20696,7 +20439,7 @@
       </p:sp>
       <p:sp>
         <p:nvSpPr>
-          <p:cNvPr id="293" name=""/>
+          <p:cNvPr id="294" name=""/>
           <p:cNvSpPr txBox="1"/>
           <p:nvPr/>
         </p:nvSpPr>
@@ -20728,11 +20471,7 @@
               </a:spcBef>
               <a:defRPr b="0" sz="2400">
                 <a:solidFill>
-                  <a:schemeClr val="accent1">
-                    <a:hueOff val="195744"/>
-                    <a:satOff val="-47052"/>
-                    <a:lumOff val="24890"/>
-                  </a:schemeClr>
+                  <a:srgbClr val="797979"/>
                 </a:solidFill>
                 <a:latin typeface="FontAwesome"/>
                 <a:ea typeface="FontAwesome"/>
@@ -20751,7 +20490,7 @@
       </p:sp>
       <p:sp>
         <p:nvSpPr>
-          <p:cNvPr id="294" name="WORKFLOW"/>
+          <p:cNvPr id="295" name="WORKFLOW"/>
           <p:cNvSpPr txBox="1"/>
           <p:nvPr/>
         </p:nvSpPr>
@@ -20787,7 +20526,7 @@
       </p:sp>
       <p:sp>
         <p:nvSpPr>
-          <p:cNvPr id="295" name="Line"/>
+          <p:cNvPr id="296" name="Line"/>
           <p:cNvSpPr/>
           <p:nvPr/>
         </p:nvSpPr>
@@ -20830,7 +20569,7 @@
       </p:sp>
       <p:sp>
         <p:nvSpPr>
-          <p:cNvPr id="296" name="SUBMIT YOUR PACKAGE…"/>
+          <p:cNvPr id="297" name="SUBMIT YOUR PACKAGE…"/>
           <p:cNvSpPr txBox="1"/>
           <p:nvPr/>
         </p:nvSpPr>
@@ -20890,7 +20629,7 @@
             </a:pPr>
             <a:r>
               <a:rPr u="sng">
-                <a:hlinkClick r:id="rId7" invalidUrl="" action="" tgtFrame="" tooltip="" history="1" highlightClick="0" endSnd="0"/>
+                <a:hlinkClick r:id="rId8" invalidUrl="" action="" tgtFrame="" tooltip="" history="1" highlightClick="0" endSnd="0"/>
               </a:rPr>
               <a:t>r-pkgs.had.co.nz/release.html</a:t>
             </a:r>
@@ -20899,14 +20638,14 @@
       </p:sp>
       <p:pic>
         <p:nvPicPr>
-          <p:cNvPr id="297" name="devtools.png" descr="devtools.png"/>
+          <p:cNvPr id="298" name="devtools.png" descr="devtools.png"/>
           <p:cNvPicPr>
             <a:picLocks noChangeAspect="1"/>
           </p:cNvPicPr>
           <p:nvPr/>
         </p:nvPicPr>
         <p:blipFill>
-          <a:blip r:embed="rId8">
+          <a:blip r:embed="rId9">
             <a:extLst/>
           </a:blip>
           <a:stretch>
@@ -20928,14 +20667,14 @@
       </p:pic>
       <p:pic>
         <p:nvPicPr>
-          <p:cNvPr id="298" name="roxygen2.png" descr="roxygen2.png"/>
+          <p:cNvPr id="299" name="roxygen2.png" descr="roxygen2.png"/>
           <p:cNvPicPr>
             <a:picLocks noChangeAspect="1"/>
           </p:cNvPicPr>
           <p:nvPr/>
         </p:nvPicPr>
         <p:blipFill>
-          <a:blip r:embed="rId9">
+          <a:blip r:embed="rId10">
             <a:extLst/>
           </a:blip>
           <a:stretch>
@@ -20957,7 +20696,7 @@
       </p:pic>
       <p:sp>
         <p:nvSpPr>
-          <p:cNvPr id="299" name="ROXYGEN2"/>
+          <p:cNvPr id="300" name="ROXYGEN2"/>
           <p:cNvSpPr txBox="1"/>
           <p:nvPr/>
         </p:nvSpPr>

</xml_diff>